<commit_message>
Presentation on Jaica Folow Up
Presentation on Jaica Folow Up
</commit_message>
<xml_diff>
--- a/Civilworks cost/Work Schedule/PPT on Follow UP of JICA Meeting on 18_11_20202/Follow UP on JICA Meeting and Actions Required To Taken.pptx
+++ b/Civilworks cost/Work Schedule/PPT on Follow UP of JICA Meeting on 18_11_20202/Follow UP on JICA Meeting and Actions Required To Taken.pptx
@@ -5,31 +5,21 @@
     <p:sldMasterId id="2147483648" r:id="rId1"/>
   </p:sldMasterIdLst>
   <p:notesMasterIdLst>
-    <p:notesMasterId r:id="rId24"/>
+    <p:notesMasterId r:id="rId14"/>
   </p:notesMasterIdLst>
   <p:sldIdLst>
     <p:sldId id="256" r:id="rId2"/>
     <p:sldId id="257" r:id="rId3"/>
     <p:sldId id="258" r:id="rId4"/>
     <p:sldId id="260" r:id="rId5"/>
-    <p:sldId id="259" r:id="rId6"/>
-    <p:sldId id="264" r:id="rId7"/>
-    <p:sldId id="274" r:id="rId8"/>
-    <p:sldId id="275" r:id="rId9"/>
+    <p:sldId id="276" r:id="rId6"/>
+    <p:sldId id="259" r:id="rId7"/>
+    <p:sldId id="264" r:id="rId8"/>
+    <p:sldId id="274" r:id="rId9"/>
     <p:sldId id="268" r:id="rId10"/>
-    <p:sldId id="276" r:id="rId11"/>
+    <p:sldId id="275" r:id="rId11"/>
     <p:sldId id="277" r:id="rId12"/>
-    <p:sldId id="265" r:id="rId13"/>
-    <p:sldId id="273" r:id="rId14"/>
-    <p:sldId id="261" r:id="rId15"/>
-    <p:sldId id="262" r:id="rId16"/>
-    <p:sldId id="263" r:id="rId17"/>
-    <p:sldId id="266" r:id="rId18"/>
-    <p:sldId id="267" r:id="rId19"/>
-    <p:sldId id="269" r:id="rId20"/>
-    <p:sldId id="270" r:id="rId21"/>
-    <p:sldId id="271" r:id="rId22"/>
-    <p:sldId id="272" r:id="rId23"/>
+    <p:sldId id="273" r:id="rId13"/>
   </p:sldIdLst>
   <p:sldSz cx="12192000" cy="6858000"/>
   <p:notesSz cx="6858000" cy="9144000"/>
@@ -128,7 +118,579 @@
       </a:defRPr>
     </a:lvl9pPr>
   </p:defaultTextStyle>
+  <p:extLst>
+    <p:ext uri="{EFAFB233-063F-42B5-8137-9DF3F51BA10A}">
+      <p15:sldGuideLst xmlns:p15="http://schemas.microsoft.com/office/powerpoint/2012/main"/>
+    </p:ext>
+  </p:extLst>
 </p:presentation>
+</file>
+
+<file path=ppt/charts/chart1.xml><?xml version="1.0" encoding="utf-8"?>
+<c:chartSpace xmlns:c="http://schemas.openxmlformats.org/drawingml/2006/chart" xmlns:a="http://schemas.openxmlformats.org/drawingml/2006/main" xmlns:r="http://schemas.openxmlformats.org/officeDocument/2006/relationships" xmlns:c16r2="http://schemas.microsoft.com/office/drawing/2015/06/chart">
+  <c:date1904 val="0"/>
+  <c:lang val="en-US"/>
+  <c:roundedCorners val="0"/>
+  <mc:AlternateContent xmlns:mc="http://schemas.openxmlformats.org/markup-compatibility/2006">
+    <mc:Choice xmlns:c14="http://schemas.microsoft.com/office/drawing/2007/8/2/chart" Requires="c14">
+      <c14:style val="102"/>
+    </mc:Choice>
+    <mc:Fallback>
+      <c:style val="2"/>
+    </mc:Fallback>
+  </mc:AlternateContent>
+  <c:chart>
+    <c:autoTitleDeleted val="1"/>
+    <c:plotArea>
+      <c:layout>
+        <c:manualLayout>
+          <c:layoutTarget val="inner"/>
+          <c:xMode val="edge"/>
+          <c:yMode val="edge"/>
+          <c:x val="7.7237849286563631E-2"/>
+          <c:y val="5.7413834242506852E-2"/>
+          <c:w val="0.9051910916904925"/>
+          <c:h val="0.86937339209840336"/>
+        </c:manualLayout>
+      </c:layout>
+      <c:barChart>
+        <c:barDir val="col"/>
+        <c:grouping val="clustered"/>
+        <c:varyColors val="0"/>
+        <c:ser>
+          <c:idx val="0"/>
+          <c:order val="0"/>
+          <c:tx>
+            <c:v>Total Target as Per 2nd RDPP</c:v>
+          </c:tx>
+          <c:invertIfNegative val="0"/>
+          <c:dLbls>
+            <c:spPr>
+              <a:noFill/>
+              <a:ln>
+                <a:noFill/>
+              </a:ln>
+              <a:effectLst/>
+            </c:spPr>
+            <c:txPr>
+              <a:bodyPr rot="-5400000" vert="horz" wrap="square" lIns="38100" tIns="19050" rIns="38100" bIns="19050" anchor="ctr">
+                <a:spAutoFit/>
+              </a:bodyPr>
+              <a:lstStyle/>
+              <a:p>
+                <a:pPr>
+                  <a:defRPr sz="1800"/>
+                </a:pPr>
+                <a:endParaRPr lang="en-US"/>
+              </a:p>
+            </c:txPr>
+            <c:showLegendKey val="0"/>
+            <c:showVal val="1"/>
+            <c:showCatName val="0"/>
+            <c:showSerName val="0"/>
+            <c:showPercent val="0"/>
+            <c:showBubbleSize val="0"/>
+            <c:showLeaderLines val="0"/>
+            <c:extLst>
+              <c:ext xmlns:c15="http://schemas.microsoft.com/office/drawing/2012/chart" uri="{CE6537A1-D6FC-4f65-9D91-7224C49458BB}">
+                <c15:layout/>
+                <c15:showLeaderLines val="1"/>
+              </c:ext>
+            </c:extLst>
+          </c:dLbls>
+          <c:cat>
+            <c:strRef>
+              <c:f>'This Years Physical Work Progra'!$A$2:$A$13</c:f>
+              <c:strCache>
+                <c:ptCount val="12"/>
+                <c:pt idx="0">
+                  <c:v> Inlet</c:v>
+                </c:pt>
+                <c:pt idx="1">
+                  <c:v>Reg Re-inst</c:v>
+                </c:pt>
+                <c:pt idx="2">
+                  <c:v> Reg/ CW/BDO</c:v>
+                </c:pt>
+                <c:pt idx="3">
+                  <c:v> Khal/River (New)</c:v>
+                </c:pt>
+                <c:pt idx="4">
+                  <c:v> Khal/River (Rehab )</c:v>
+                </c:pt>
+                <c:pt idx="5">
+                  <c:v> Full Emb</c:v>
+                </c:pt>
+                <c:pt idx="6">
+                  <c:v>Subm Emb (Rehab)</c:v>
+                </c:pt>
+                <c:pt idx="7">
+                  <c:v>Subm Emb (New)</c:v>
+                </c:pt>
+                <c:pt idx="8">
+                  <c:v>Rehabof Reg</c:v>
+                </c:pt>
+                <c:pt idx="9">
+                  <c:v> WMG office</c:v>
+                </c:pt>
+                <c:pt idx="10">
+                  <c:v> Threshing Floor</c:v>
+                </c:pt>
+                <c:pt idx="11">
+                  <c:v>Gate</c:v>
+                </c:pt>
+              </c:strCache>
+            </c:strRef>
+          </c:cat>
+          <c:val>
+            <c:numRef>
+              <c:f>'This Years Physical Work Progra'!$C$2:$C$13</c:f>
+              <c:numCache>
+                <c:formatCode>General</c:formatCode>
+                <c:ptCount val="12"/>
+                <c:pt idx="0">
+                  <c:v>116</c:v>
+                </c:pt>
+                <c:pt idx="1">
+                  <c:v>5</c:v>
+                </c:pt>
+                <c:pt idx="2">
+                  <c:v>112</c:v>
+                </c:pt>
+                <c:pt idx="3">
+                  <c:v>338</c:v>
+                </c:pt>
+                <c:pt idx="4">
+                  <c:v>109</c:v>
+                </c:pt>
+                <c:pt idx="5">
+                  <c:v>68</c:v>
+                </c:pt>
+                <c:pt idx="6">
+                  <c:v>62</c:v>
+                </c:pt>
+                <c:pt idx="7">
+                  <c:v>263</c:v>
+                </c:pt>
+                <c:pt idx="8">
+                  <c:v>7</c:v>
+                </c:pt>
+                <c:pt idx="9">
+                  <c:v>30</c:v>
+                </c:pt>
+                <c:pt idx="10">
+                  <c:v>5</c:v>
+                </c:pt>
+                <c:pt idx="11">
+                  <c:v>86</c:v>
+                </c:pt>
+              </c:numCache>
+            </c:numRef>
+          </c:val>
+          <c:extLst>
+            <c:ext xmlns:c16="http://schemas.microsoft.com/office/drawing/2014/chart" uri="{C3380CC4-5D6E-409C-BE32-E72D297353CC}">
+              <c16:uniqueId val="{00000000-15E6-4041-9FF2-4FB40F3E2C98}"/>
+            </c:ext>
+          </c:extLst>
+        </c:ser>
+        <c:ser>
+          <c:idx val="1"/>
+          <c:order val="1"/>
+          <c:tx>
+            <c:v>Program</c:v>
+          </c:tx>
+          <c:invertIfNegative val="0"/>
+          <c:dLbls>
+            <c:spPr>
+              <a:noFill/>
+              <a:ln>
+                <a:noFill/>
+              </a:ln>
+              <a:effectLst/>
+            </c:spPr>
+            <c:txPr>
+              <a:bodyPr rot="-5400000" vert="horz" wrap="square" lIns="38100" tIns="19050" rIns="38100" bIns="19050" anchor="ctr">
+                <a:spAutoFit/>
+              </a:bodyPr>
+              <a:lstStyle/>
+              <a:p>
+                <a:pPr>
+                  <a:defRPr sz="1800"/>
+                </a:pPr>
+                <a:endParaRPr lang="en-US"/>
+              </a:p>
+            </c:txPr>
+            <c:showLegendKey val="0"/>
+            <c:showVal val="1"/>
+            <c:showCatName val="0"/>
+            <c:showSerName val="0"/>
+            <c:showPercent val="0"/>
+            <c:showBubbleSize val="0"/>
+            <c:showLeaderLines val="0"/>
+            <c:extLst>
+              <c:ext xmlns:c15="http://schemas.microsoft.com/office/drawing/2012/chart" uri="{CE6537A1-D6FC-4f65-9D91-7224C49458BB}">
+                <c15:layout/>
+                <c15:showLeaderLines val="1"/>
+              </c:ext>
+            </c:extLst>
+          </c:dLbls>
+          <c:val>
+            <c:numRef>
+              <c:f>'This Years Physical Work Progra'!$D$2:$D$13</c:f>
+              <c:numCache>
+                <c:formatCode>General</c:formatCode>
+                <c:ptCount val="12"/>
+                <c:pt idx="0">
+                  <c:v>50</c:v>
+                </c:pt>
+                <c:pt idx="1">
+                  <c:v>3</c:v>
+                </c:pt>
+                <c:pt idx="2">
+                  <c:v>30</c:v>
+                </c:pt>
+                <c:pt idx="3">
+                  <c:v>75</c:v>
+                </c:pt>
+                <c:pt idx="4">
+                  <c:v>34</c:v>
+                </c:pt>
+                <c:pt idx="5">
+                  <c:v>7</c:v>
+                </c:pt>
+                <c:pt idx="6">
+                  <c:v>8</c:v>
+                </c:pt>
+                <c:pt idx="7">
+                  <c:v>50</c:v>
+                </c:pt>
+                <c:pt idx="8">
+                  <c:v>4</c:v>
+                </c:pt>
+                <c:pt idx="9">
+                  <c:v>13</c:v>
+                </c:pt>
+                <c:pt idx="10">
+                  <c:v>3</c:v>
+                </c:pt>
+                <c:pt idx="11">
+                  <c:v>19</c:v>
+                </c:pt>
+              </c:numCache>
+            </c:numRef>
+          </c:val>
+          <c:extLst>
+            <c:ext xmlns:c16="http://schemas.microsoft.com/office/drawing/2014/chart" uri="{C3380CC4-5D6E-409C-BE32-E72D297353CC}">
+              <c16:uniqueId val="{00000001-15E6-4041-9FF2-4FB40F3E2C98}"/>
+            </c:ext>
+          </c:extLst>
+        </c:ser>
+        <c:dLbls>
+          <c:showLegendKey val="0"/>
+          <c:showVal val="0"/>
+          <c:showCatName val="0"/>
+          <c:showSerName val="0"/>
+          <c:showPercent val="0"/>
+          <c:showBubbleSize val="0"/>
+        </c:dLbls>
+        <c:gapWidth val="204"/>
+        <c:overlap val="1"/>
+        <c:axId val="174001536"/>
+        <c:axId val="174040192"/>
+      </c:barChart>
+      <c:catAx>
+        <c:axId val="174001536"/>
+        <c:scaling>
+          <c:orientation val="minMax"/>
+        </c:scaling>
+        <c:delete val="0"/>
+        <c:axPos val="b"/>
+        <c:numFmt formatCode="General" sourceLinked="1"/>
+        <c:majorTickMark val="none"/>
+        <c:minorTickMark val="none"/>
+        <c:tickLblPos val="low"/>
+        <c:spPr>
+          <a:noFill/>
+          <a:ln w="9525" cap="flat" cmpd="sng" algn="ctr">
+            <a:solidFill>
+              <a:schemeClr val="tx1">
+                <a:lumMod val="15000"/>
+                <a:lumOff val="85000"/>
+              </a:schemeClr>
+            </a:solidFill>
+            <a:round/>
+          </a:ln>
+          <a:effectLst/>
+        </c:spPr>
+        <c:txPr>
+          <a:bodyPr rot="-5400000" spcFirstLastPara="1" vertOverflow="ellipsis" vert="horz" wrap="square" anchor="ctr" anchorCtr="1"/>
+          <a:lstStyle/>
+          <a:p>
+            <a:pPr>
+              <a:defRPr sz="1100" b="0" i="0" u="none" strike="noStrike" kern="1200" baseline="0">
+                <a:ln>
+                  <a:noFill/>
+                </a:ln>
+                <a:solidFill>
+                  <a:schemeClr val="tx1"/>
+                </a:solidFill>
+                <a:latin typeface="+mn-lt"/>
+                <a:ea typeface="+mn-ea"/>
+                <a:cs typeface="+mn-cs"/>
+              </a:defRPr>
+            </a:pPr>
+            <a:endParaRPr lang="en-US"/>
+          </a:p>
+        </c:txPr>
+        <c:crossAx val="174040192"/>
+        <c:crosses val="autoZero"/>
+        <c:auto val="0"/>
+        <c:lblAlgn val="ctr"/>
+        <c:lblOffset val="100"/>
+        <c:noMultiLvlLbl val="0"/>
+      </c:catAx>
+      <c:valAx>
+        <c:axId val="174040192"/>
+        <c:scaling>
+          <c:orientation val="minMax"/>
+          <c:max val="370"/>
+          <c:min val="0"/>
+        </c:scaling>
+        <c:delete val="0"/>
+        <c:axPos val="l"/>
+        <c:majorGridlines>
+          <c:spPr>
+            <a:ln w="9525" cap="flat" cmpd="sng" algn="ctr">
+              <a:solidFill>
+                <a:schemeClr val="tx1">
+                  <a:lumMod val="15000"/>
+                  <a:lumOff val="85000"/>
+                </a:schemeClr>
+              </a:solidFill>
+              <a:round/>
+            </a:ln>
+            <a:effectLst/>
+          </c:spPr>
+        </c:majorGridlines>
+        <c:title>
+          <c:tx>
+            <c:rich>
+              <a:bodyPr rot="-5400000" spcFirstLastPara="1" vertOverflow="ellipsis" vert="horz" wrap="square" anchor="ctr" anchorCtr="1"/>
+              <a:lstStyle/>
+              <a:p>
+                <a:pPr>
+                  <a:defRPr sz="1000" b="0" i="0" u="none" strike="noStrike" kern="1200" baseline="0">
+                    <a:solidFill>
+                      <a:schemeClr val="tx1"/>
+                    </a:solidFill>
+                    <a:latin typeface="+mn-lt"/>
+                    <a:ea typeface="+mn-ea"/>
+                    <a:cs typeface="+mn-cs"/>
+                  </a:defRPr>
+                </a:pPr>
+                <a:r>
+                  <a:rPr lang="en-US" sz="1000"/>
+                  <a:t>BDT  Crore</a:t>
+                </a:r>
+              </a:p>
+            </c:rich>
+          </c:tx>
+          <c:layout/>
+          <c:overlay val="0"/>
+          <c:spPr>
+            <a:noFill/>
+            <a:ln>
+              <a:noFill/>
+            </a:ln>
+            <a:effectLst/>
+          </c:spPr>
+        </c:title>
+        <c:numFmt formatCode="0" sourceLinked="0"/>
+        <c:majorTickMark val="in"/>
+        <c:minorTickMark val="out"/>
+        <c:tickLblPos val="low"/>
+        <c:spPr>
+          <a:noFill/>
+          <a:ln>
+            <a:solidFill>
+              <a:schemeClr val="accent1"/>
+            </a:solidFill>
+          </a:ln>
+          <a:effectLst/>
+        </c:spPr>
+        <c:txPr>
+          <a:bodyPr rot="-5400000" spcFirstLastPara="1" vertOverflow="ellipsis" wrap="square" anchor="ctr" anchorCtr="1"/>
+          <a:lstStyle/>
+          <a:p>
+            <a:pPr>
+              <a:defRPr sz="1600" b="0" i="0" u="none" strike="noStrike" kern="1200" baseline="0">
+                <a:solidFill>
+                  <a:schemeClr val="tx1"/>
+                </a:solidFill>
+                <a:latin typeface="+mn-lt"/>
+                <a:ea typeface="+mn-ea"/>
+                <a:cs typeface="+mn-cs"/>
+              </a:defRPr>
+            </a:pPr>
+            <a:endParaRPr lang="en-US"/>
+          </a:p>
+        </c:txPr>
+        <c:crossAx val="174001536"/>
+        <c:crosses val="autoZero"/>
+        <c:crossBetween val="midCat"/>
+        <c:majorUnit val="50"/>
+        <c:minorUnit val="10"/>
+      </c:valAx>
+      <c:spPr>
+        <a:noFill/>
+        <a:ln>
+          <a:noFill/>
+        </a:ln>
+        <a:effectLst/>
+      </c:spPr>
+    </c:plotArea>
+    <c:legend>
+      <c:legendPos val="t"/>
+      <c:layout>
+        <c:manualLayout>
+          <c:xMode val="edge"/>
+          <c:yMode val="edge"/>
+          <c:x val="0.38287856414201166"/>
+          <c:y val="5.8990815259583995E-2"/>
+          <c:w val="0.59694671561035628"/>
+          <c:h val="3.1139094273003511E-2"/>
+        </c:manualLayout>
+      </c:layout>
+      <c:overlay val="0"/>
+      <c:spPr>
+        <a:noFill/>
+        <a:ln>
+          <a:noFill/>
+        </a:ln>
+        <a:effectLst/>
+      </c:spPr>
+      <c:txPr>
+        <a:bodyPr rot="0" spcFirstLastPara="1" vertOverflow="ellipsis" vert="horz" wrap="square" anchor="ctr" anchorCtr="1"/>
+        <a:lstStyle/>
+        <a:p>
+          <a:pPr>
+            <a:defRPr sz="1600" b="0" i="0" u="none" strike="noStrike" kern="1200" baseline="0">
+              <a:solidFill>
+                <a:schemeClr val="tx1"/>
+              </a:solidFill>
+              <a:latin typeface="+mn-lt"/>
+              <a:ea typeface="+mn-ea"/>
+              <a:cs typeface="+mn-cs"/>
+            </a:defRPr>
+          </a:pPr>
+          <a:endParaRPr lang="en-US"/>
+        </a:p>
+      </c:txPr>
+    </c:legend>
+    <c:plotVisOnly val="1"/>
+    <c:dispBlanksAs val="gap"/>
+    <c:showDLblsOverMax val="0"/>
+  </c:chart>
+  <c:spPr>
+    <a:solidFill>
+      <a:schemeClr val="bg1"/>
+    </a:solidFill>
+    <a:ln w="9525" cap="flat" cmpd="sng" algn="ctr">
+      <a:solidFill>
+        <a:schemeClr val="accent1"/>
+      </a:solidFill>
+      <a:round/>
+    </a:ln>
+    <a:effectLst/>
+  </c:spPr>
+  <c:txPr>
+    <a:bodyPr/>
+    <a:lstStyle/>
+    <a:p>
+      <a:pPr>
+        <a:defRPr>
+          <a:solidFill>
+            <a:schemeClr val="tx1"/>
+          </a:solidFill>
+        </a:defRPr>
+      </a:pPr>
+      <a:endParaRPr lang="en-US"/>
+    </a:p>
+  </c:txPr>
+  <c:externalData r:id="rId1">
+    <c:autoUpdate val="0"/>
+  </c:externalData>
+  <c:userShapes r:id="rId2"/>
+</c:chartSpace>
+</file>
+
+<file path=ppt/drawings/drawing1.xml><?xml version="1.0" encoding="utf-8"?>
+<c:userShapes xmlns:c="http://schemas.openxmlformats.org/drawingml/2006/chart">
+  <cdr:relSizeAnchor xmlns:cdr="http://schemas.openxmlformats.org/drawingml/2006/chartDrawing">
+    <cdr:from>
+      <cdr:x>0.14016</cdr:x>
+      <cdr:y>0.12364</cdr:y>
+    </cdr:from>
+    <cdr:to>
+      <cdr:x>0.52913</cdr:x>
+      <cdr:y>0.16052</cdr:y>
+    </cdr:to>
+    <cdr:sp macro="" textlink="">
+      <cdr:nvSpPr>
+        <cdr:cNvPr id="2" name="TextBox 1"/>
+        <cdr:cNvSpPr txBox="1"/>
+      </cdr:nvSpPr>
+      <cdr:spPr>
+        <a:xfrm xmlns:a="http://schemas.openxmlformats.org/drawingml/2006/main">
+          <a:off x="1211036" y="775607"/>
+          <a:ext cx="3360964" cy="231322"/>
+        </a:xfrm>
+        <a:prstGeom xmlns:a="http://schemas.openxmlformats.org/drawingml/2006/main" prst="rect">
+          <a:avLst/>
+        </a:prstGeom>
+      </cdr:spPr>
+      <cdr:txBody>
+        <a:bodyPr xmlns:a="http://schemas.openxmlformats.org/drawingml/2006/main" vertOverflow="clip" wrap="square" rtlCol="0"/>
+        <a:lstStyle xmlns:a="http://schemas.openxmlformats.org/drawingml/2006/main"/>
+        <a:p xmlns:a="http://schemas.openxmlformats.org/drawingml/2006/main">
+          <a:endParaRPr lang="en-US" sz="1100"/>
+        </a:p>
+      </cdr:txBody>
+    </cdr:sp>
+  </cdr:relSizeAnchor>
+  <cdr:relSizeAnchor xmlns:cdr="http://schemas.openxmlformats.org/drawingml/2006/chartDrawing">
+    <cdr:from>
+      <cdr:x>0.13701</cdr:x>
+      <cdr:y>0.28633</cdr:y>
+    </cdr:from>
+    <cdr:to>
+      <cdr:x>0.37638</cdr:x>
+      <cdr:y>0.37093</cdr:y>
+    </cdr:to>
+    <cdr:sp macro="" textlink="">
+      <cdr:nvSpPr>
+        <cdr:cNvPr id="3" name="TextBox 2"/>
+        <cdr:cNvSpPr txBox="1"/>
+      </cdr:nvSpPr>
+      <cdr:spPr>
+        <a:xfrm xmlns:a="http://schemas.openxmlformats.org/drawingml/2006/main">
+          <a:off x="1183821" y="1796143"/>
+          <a:ext cx="2068286" cy="530678"/>
+        </a:xfrm>
+        <a:prstGeom xmlns:a="http://schemas.openxmlformats.org/drawingml/2006/main" prst="rect">
+          <a:avLst/>
+        </a:prstGeom>
+      </cdr:spPr>
+      <cdr:txBody>
+        <a:bodyPr xmlns:a="http://schemas.openxmlformats.org/drawingml/2006/main" vertOverflow="clip" wrap="square" rtlCol="0"/>
+        <a:lstStyle xmlns:a="http://schemas.openxmlformats.org/drawingml/2006/main"/>
+        <a:p xmlns:a="http://schemas.openxmlformats.org/drawingml/2006/main">
+          <a:endParaRPr lang="en-US" sz="1100"/>
+        </a:p>
+      </cdr:txBody>
+    </cdr:sp>
+  </cdr:relSizeAnchor>
+</c:userShapes>
 </file>
 
 <file path=ppt/notesMasters/notesMaster1.xml><?xml version="1.0" encoding="utf-8"?>
@@ -3555,7 +4117,7 @@
     <p:bg>
       <p:bgPr>
         <a:blipFill dpi="0" rotWithShape="1">
-          <a:blip r:embed="rId2">
+          <a:blip r:embed="rId3">
             <a:lum/>
           </a:blip>
           <a:srcRect/>
@@ -3602,45 +4164,81 @@
           </a:bodyPr>
           <a:lstStyle/>
           <a:p>
+            <a:pPr algn="ctr"/>
+            <a:r>
+              <a:rPr lang="en-US" dirty="0" err="1" smtClean="0"/>
+              <a:t>Yearwise</a:t>
+            </a:r>
             <a:r>
               <a:rPr lang="en-US" dirty="0" smtClean="0"/>
-              <a:t>Activity Plan for Next TWO Years?</a:t>
+              <a:t> Civil Works Expenditure</a:t>
             </a:r>
             <a:endParaRPr lang="en-US" dirty="0"/>
           </a:p>
         </p:txBody>
       </p:sp>
-      <p:sp>
-        <p:nvSpPr>
-          <p:cNvPr id="3" name="Content Placeholder 2"/>
-          <p:cNvSpPr>
-            <a:spLocks noGrp="1"/>
-          </p:cNvSpPr>
+      <p:graphicFrame>
+        <p:nvGraphicFramePr>
+          <p:cNvPr id="4" name="Content Placeholder 3"/>
+          <p:cNvGraphicFramePr>
+            <a:graphicFrameLocks noGrp="1" noChangeAspect="1"/>
+          </p:cNvGraphicFramePr>
           <p:nvPr>
             <p:ph idx="1"/>
-          </p:nvPr>
-        </p:nvSpPr>
-        <p:spPr>
-          <a:xfrm>
-            <a:off x="838200" y="914400"/>
-            <a:ext cx="10515600" cy="5262563"/>
-          </a:xfrm>
-        </p:spPr>
-        <p:txBody>
-          <a:bodyPr/>
-          <a:lstStyle/>
-          <a:p>
-            <a:pPr marL="0" indent="0">
-              <a:buNone/>
-            </a:pPr>
-            <a:endParaRPr lang="en-US" dirty="0"/>
-          </a:p>
-        </p:txBody>
-      </p:sp>
+            <p:extLst>
+              <p:ext uri="{D42A27DB-BD31-4B8C-83A1-F6EECF244321}">
+                <p14:modId xmlns:p14="http://schemas.microsoft.com/office/powerpoint/2010/main" val="2286468471"/>
+              </p:ext>
+            </p:extLst>
+          </p:nvPr>
+        </p:nvGraphicFramePr>
+        <p:xfrm>
+          <a:off x="319314" y="812800"/>
+          <a:ext cx="11669485" cy="6045200"/>
+        </p:xfrm>
+        <a:graphic>
+          <a:graphicData uri="http://schemas.openxmlformats.org/presentationml/2006/ole">
+            <mc:AlternateContent xmlns:mc="http://schemas.openxmlformats.org/markup-compatibility/2006">
+              <mc:Choice xmlns:v="urn:schemas-microsoft-com:vml" Requires="v">
+                <p:oleObj spid="_x0000_s1027" name="PDF" r:id="rId4" imgW="0" imgH="360" progId="FoxitPhantomPDF.Document">
+                  <p:embed/>
+                </p:oleObj>
+              </mc:Choice>
+              <mc:Fallback>
+                <p:oleObj name="PDF" r:id="rId4" imgW="0" imgH="360" progId="FoxitPhantomPDF.Document">
+                  <p:embed/>
+                  <p:pic>
+                    <p:nvPicPr>
+                      <p:cNvPr id="0" name=""/>
+                      <p:cNvPicPr/>
+                      <p:nvPr/>
+                    </p:nvPicPr>
+                    <p:blipFill>
+                      <a:blip r:embed="rId5"/>
+                      <a:stretch>
+                        <a:fillRect/>
+                      </a:stretch>
+                    </p:blipFill>
+                    <p:spPr>
+                      <a:xfrm>
+                        <a:off x="319314" y="812800"/>
+                        <a:ext cx="11669485" cy="6045200"/>
+                      </a:xfrm>
+                      <a:prstGeom prst="rect">
+                        <a:avLst/>
+                      </a:prstGeom>
+                    </p:spPr>
+                  </p:pic>
+                </p:oleObj>
+              </mc:Fallback>
+            </mc:AlternateContent>
+          </a:graphicData>
+        </a:graphic>
+      </p:graphicFrame>
     </p:spTree>
     <p:extLst>
       <p:ext uri="{BB962C8B-B14F-4D97-AF65-F5344CB8AC3E}">
-        <p14:creationId xmlns:p14="http://schemas.microsoft.com/office/powerpoint/2010/main" val="3928921083"/>
+        <p14:creationId xmlns:p14="http://schemas.microsoft.com/office/powerpoint/2010/main" val="97388935"/>
       </p:ext>
     </p:extLst>
   </p:cSld>
@@ -3794,202 +4392,6 @@
         </p:nvSpPr>
         <p:spPr/>
         <p:txBody>
-          <a:bodyPr>
-            <a:normAutofit/>
-          </a:bodyPr>
-          <a:lstStyle/>
-          <a:p>
-            <a:pPr algn="ctr">
-              <a:lnSpc>
-                <a:spcPct val="100000"/>
-              </a:lnSpc>
-              <a:spcBef>
-                <a:spcPts val="1200"/>
-              </a:spcBef>
-              <a:spcAft>
-                <a:spcPts val="1200"/>
-              </a:spcAft>
-            </a:pPr>
-            <a:r>
-              <a:rPr lang="en-US" sz="3000" dirty="0" smtClean="0">
-                <a:solidFill>
-                  <a:srgbClr val="0070C0"/>
-                </a:solidFill>
-                <a:latin typeface="Century Gothic" panose="020B0502020202020204" pitchFamily="34" charset="0"/>
-                <a:ea typeface="+mn-ea"/>
-                <a:cs typeface="+mn-cs"/>
-              </a:rPr>
-              <a:t>Progress of </a:t>
-            </a:r>
-            <a:r>
-              <a:rPr lang="en-US" sz="3000" dirty="0">
-                <a:solidFill>
-                  <a:srgbClr val="0070C0"/>
-                </a:solidFill>
-                <a:latin typeface="Century Gothic" panose="020B0502020202020204" pitchFamily="34" charset="0"/>
-                <a:ea typeface="+mn-ea"/>
-                <a:cs typeface="+mn-cs"/>
-              </a:rPr>
-              <a:t>Re-excavation of Khal/River (Rehab </a:t>
-            </a:r>
-            <a:r>
-              <a:rPr lang="en-US" sz="3000" dirty="0" err="1">
-                <a:solidFill>
-                  <a:srgbClr val="0070C0"/>
-                </a:solidFill>
-                <a:latin typeface="Century Gothic" panose="020B0502020202020204" pitchFamily="34" charset="0"/>
-                <a:ea typeface="+mn-ea"/>
-                <a:cs typeface="+mn-cs"/>
-              </a:rPr>
-              <a:t>Haor</a:t>
-            </a:r>
-            <a:r>
-              <a:rPr lang="en-US" sz="3000" dirty="0">
-                <a:solidFill>
-                  <a:srgbClr val="0070C0"/>
-                </a:solidFill>
-                <a:latin typeface="Century Gothic" panose="020B0502020202020204" pitchFamily="34" charset="0"/>
-                <a:ea typeface="+mn-ea"/>
-                <a:cs typeface="+mn-cs"/>
-              </a:rPr>
-              <a:t>) </a:t>
-            </a:r>
-          </a:p>
-        </p:txBody>
-      </p:sp>
-      <p:sp>
-        <p:nvSpPr>
-          <p:cNvPr id="4" name="Slide Number Placeholder 3"/>
-          <p:cNvSpPr>
-            <a:spLocks noGrp="1"/>
-          </p:cNvSpPr>
-          <p:nvPr>
-            <p:ph type="sldNum" sz="quarter" idx="12"/>
-          </p:nvPr>
-        </p:nvSpPr>
-        <p:spPr/>
-        <p:txBody>
-          <a:bodyPr/>
-          <a:lstStyle/>
-          <a:p>
-            <a:fld id="{826EFCA3-36E9-4263-A920-02DD3CA5B069}" type="slidenum">
-              <a:rPr lang="en-CA" smtClean="0"/>
-              <a:pPr/>
-              <a:t>12</a:t>
-            </a:fld>
-            <a:endParaRPr lang="en-CA" dirty="0"/>
-          </a:p>
-        </p:txBody>
-      </p:sp>
-      <p:sp>
-        <p:nvSpPr>
-          <p:cNvPr id="3" name="Content Placeholder 2"/>
-          <p:cNvSpPr>
-            <a:spLocks noGrp="1"/>
-          </p:cNvSpPr>
-          <p:nvPr>
-            <p:ph idx="1"/>
-          </p:nvPr>
-        </p:nvSpPr>
-        <p:spPr/>
-        <p:txBody>
-          <a:bodyPr/>
-          <a:lstStyle/>
-          <a:p>
-            <a:endParaRPr lang="en-US"/>
-          </a:p>
-        </p:txBody>
-      </p:sp>
-      <p:pic>
-        <p:nvPicPr>
-          <p:cNvPr id="19467" name="Picture 11" descr="F:\Downloads\fwddataforppt\Khal_Riv_Rehab.jpg"/>
-          <p:cNvPicPr>
-            <a:picLocks noChangeAspect="1" noChangeArrowheads="1"/>
-          </p:cNvPicPr>
-          <p:nvPr/>
-        </p:nvPicPr>
-        <p:blipFill>
-          <a:blip r:embed="rId2">
-            <a:extLst>
-              <a:ext uri="{28A0092B-C50C-407E-A947-70E740481C1C}">
-                <a14:useLocalDpi xmlns:a14="http://schemas.microsoft.com/office/drawing/2010/main" val="0"/>
-              </a:ext>
-            </a:extLst>
-          </a:blip>
-          <a:srcRect/>
-          <a:stretch>
-            <a:fillRect/>
-          </a:stretch>
-        </p:blipFill>
-        <p:spPr bwMode="auto">
-          <a:xfrm>
-            <a:off x="218000" y="1371600"/>
-            <a:ext cx="11698697" cy="4984955"/>
-          </a:xfrm>
-          <a:prstGeom prst="rect">
-            <a:avLst/>
-          </a:prstGeom>
-          <a:noFill/>
-          <a:extLst>
-            <a:ext uri="{909E8E84-426E-40DD-AFC4-6F175D3DCCD1}">
-              <a14:hiddenFill xmlns:a14="http://schemas.microsoft.com/office/drawing/2010/main">
-                <a:solidFill>
-                  <a:srgbClr val="FFFFFF"/>
-                </a:solidFill>
-              </a14:hiddenFill>
-            </a:ext>
-          </a:extLst>
-        </p:spPr>
-      </p:pic>
-    </p:spTree>
-    <p:extLst>
-      <p:ext uri="{BB962C8B-B14F-4D97-AF65-F5344CB8AC3E}">
-        <p14:creationId xmlns:p14="http://schemas.microsoft.com/office/powerpoint/2010/main" val="3298506116"/>
-      </p:ext>
-    </p:extLst>
-  </p:cSld>
-  <p:clrMapOvr>
-    <a:masterClrMapping/>
-  </p:clrMapOvr>
-  <p:timing>
-    <p:tnLst>
-      <p:par>
-        <p:cTn id="1" dur="indefinite" restart="never" nodeType="tmRoot"/>
-      </p:par>
-    </p:tnLst>
-  </p:timing>
-</p:sld>
-</file>
-
-<file path=ppt/slides/slide13.xml><?xml version="1.0" encoding="utf-8"?>
-<p:sld xmlns:a="http://schemas.openxmlformats.org/drawingml/2006/main" xmlns:r="http://schemas.openxmlformats.org/officeDocument/2006/relationships" xmlns:p="http://schemas.openxmlformats.org/presentationml/2006/main">
-  <p:cSld>
-    <p:spTree>
-      <p:nvGrpSpPr>
-        <p:cNvPr id="1" name=""/>
-        <p:cNvGrpSpPr/>
-        <p:nvPr/>
-      </p:nvGrpSpPr>
-      <p:grpSpPr>
-        <a:xfrm>
-          <a:off x="0" y="0"/>
-          <a:ext cx="0" cy="0"/>
-          <a:chOff x="0" y="0"/>
-          <a:chExt cx="0" cy="0"/>
-        </a:xfrm>
-      </p:grpSpPr>
-      <p:sp>
-        <p:nvSpPr>
-          <p:cNvPr id="2" name="Title 1"/>
-          <p:cNvSpPr>
-            <a:spLocks noGrp="1"/>
-          </p:cNvSpPr>
-          <p:nvPr>
-            <p:ph type="title"/>
-          </p:nvPr>
-        </p:nvSpPr>
-        <p:spPr/>
-        <p:txBody>
           <a:bodyPr/>
           <a:lstStyle/>
           <a:p>
@@ -4020,1158 +4422,6 @@
     <p:extLst>
       <p:ext uri="{BB962C8B-B14F-4D97-AF65-F5344CB8AC3E}">
         <p14:creationId xmlns:p14="http://schemas.microsoft.com/office/powerpoint/2010/main" val="338434186"/>
-      </p:ext>
-    </p:extLst>
-  </p:cSld>
-  <p:clrMapOvr>
-    <a:masterClrMapping/>
-  </p:clrMapOvr>
-  <p:timing>
-    <p:tnLst>
-      <p:par>
-        <p:cTn id="1" dur="indefinite" restart="never" nodeType="tmRoot"/>
-      </p:par>
-    </p:tnLst>
-  </p:timing>
-</p:sld>
-</file>
-
-<file path=ppt/slides/slide14.xml><?xml version="1.0" encoding="utf-8"?>
-<p:sld xmlns:a="http://schemas.openxmlformats.org/drawingml/2006/main" xmlns:r="http://schemas.openxmlformats.org/officeDocument/2006/relationships" xmlns:p="http://schemas.openxmlformats.org/presentationml/2006/main">
-  <p:cSld>
-    <p:spTree>
-      <p:nvGrpSpPr>
-        <p:cNvPr id="1" name=""/>
-        <p:cNvGrpSpPr/>
-        <p:nvPr/>
-      </p:nvGrpSpPr>
-      <p:grpSpPr>
-        <a:xfrm>
-          <a:off x="0" y="0"/>
-          <a:ext cx="0" cy="0"/>
-          <a:chOff x="0" y="0"/>
-          <a:chExt cx="0" cy="0"/>
-        </a:xfrm>
-      </p:grpSpPr>
-      <p:sp>
-        <p:nvSpPr>
-          <p:cNvPr id="2" name="Title 1"/>
-          <p:cNvSpPr>
-            <a:spLocks noGrp="1"/>
-          </p:cNvSpPr>
-          <p:nvPr>
-            <p:ph type="title"/>
-          </p:nvPr>
-        </p:nvSpPr>
-        <p:spPr>
-          <a:xfrm>
-            <a:off x="838200" y="365126"/>
-            <a:ext cx="10515600" cy="508332"/>
-          </a:xfrm>
-        </p:spPr>
-        <p:txBody>
-          <a:bodyPr>
-            <a:normAutofit fontScale="90000"/>
-          </a:bodyPr>
-          <a:lstStyle/>
-          <a:p>
-            <a:pPr algn="ctr">
-              <a:lnSpc>
-                <a:spcPct val="100000"/>
-              </a:lnSpc>
-              <a:spcBef>
-                <a:spcPts val="1200"/>
-              </a:spcBef>
-              <a:spcAft>
-                <a:spcPts val="1200"/>
-              </a:spcAft>
-            </a:pPr>
-            <a:r>
-              <a:rPr lang="en-US" sz="3000" dirty="0" smtClean="0">
-                <a:solidFill>
-                  <a:srgbClr val="0070C0"/>
-                </a:solidFill>
-                <a:latin typeface="Century Gothic" panose="020B0502020202020204" pitchFamily="34" charset="0"/>
-                <a:ea typeface="+mn-ea"/>
-                <a:cs typeface="+mn-cs"/>
-              </a:rPr>
-              <a:t>Progress of Irrigation Inlet</a:t>
-            </a:r>
-            <a:endParaRPr lang="en-US" sz="3000" dirty="0">
-              <a:solidFill>
-                <a:srgbClr val="0070C0"/>
-              </a:solidFill>
-              <a:latin typeface="Century Gothic" panose="020B0502020202020204" pitchFamily="34" charset="0"/>
-              <a:ea typeface="+mn-ea"/>
-              <a:cs typeface="+mn-cs"/>
-            </a:endParaRPr>
-          </a:p>
-        </p:txBody>
-      </p:sp>
-      <p:sp>
-        <p:nvSpPr>
-          <p:cNvPr id="4" name="Slide Number Placeholder 3"/>
-          <p:cNvSpPr>
-            <a:spLocks noGrp="1"/>
-          </p:cNvSpPr>
-          <p:nvPr>
-            <p:ph type="sldNum" sz="quarter" idx="12"/>
-          </p:nvPr>
-        </p:nvSpPr>
-        <p:spPr/>
-        <p:txBody>
-          <a:bodyPr/>
-          <a:lstStyle/>
-          <a:p>
-            <a:fld id="{826EFCA3-36E9-4263-A920-02DD3CA5B069}" type="slidenum">
-              <a:rPr lang="en-CA" smtClean="0"/>
-              <a:pPr/>
-              <a:t>14</a:t>
-            </a:fld>
-            <a:endParaRPr lang="en-CA" dirty="0"/>
-          </a:p>
-        </p:txBody>
-      </p:sp>
-      <p:sp>
-        <p:nvSpPr>
-          <p:cNvPr id="6" name="Content Placeholder 5"/>
-          <p:cNvSpPr>
-            <a:spLocks noGrp="1"/>
-          </p:cNvSpPr>
-          <p:nvPr>
-            <p:ph idx="1"/>
-          </p:nvPr>
-        </p:nvSpPr>
-        <p:spPr/>
-        <p:txBody>
-          <a:bodyPr/>
-          <a:lstStyle/>
-          <a:p>
-            <a:endParaRPr lang="en-US"/>
-          </a:p>
-        </p:txBody>
-      </p:sp>
-      <p:pic>
-        <p:nvPicPr>
-          <p:cNvPr id="15372" name="Picture 12" descr="F:\Downloads\fwddataforppt\Inlet.jpg"/>
-          <p:cNvPicPr>
-            <a:picLocks noChangeAspect="1" noChangeArrowheads="1"/>
-          </p:cNvPicPr>
-          <p:nvPr/>
-        </p:nvPicPr>
-        <p:blipFill>
-          <a:blip r:embed="rId2">
-            <a:extLst>
-              <a:ext uri="{28A0092B-C50C-407E-A947-70E740481C1C}">
-                <a14:useLocalDpi xmlns:a14="http://schemas.microsoft.com/office/drawing/2010/main" val="0"/>
-              </a:ext>
-            </a:extLst>
-          </a:blip>
-          <a:srcRect/>
-          <a:stretch>
-            <a:fillRect/>
-          </a:stretch>
-        </p:blipFill>
-        <p:spPr bwMode="auto">
-          <a:xfrm>
-            <a:off x="539750" y="870155"/>
-            <a:ext cx="10949244" cy="5557633"/>
-          </a:xfrm>
-          <a:prstGeom prst="rect">
-            <a:avLst/>
-          </a:prstGeom>
-          <a:noFill/>
-          <a:extLst>
-            <a:ext uri="{909E8E84-426E-40DD-AFC4-6F175D3DCCD1}">
-              <a14:hiddenFill xmlns:a14="http://schemas.microsoft.com/office/drawing/2010/main">
-                <a:solidFill>
-                  <a:srgbClr val="FFFFFF"/>
-                </a:solidFill>
-              </a14:hiddenFill>
-            </a:ext>
-          </a:extLst>
-        </p:spPr>
-      </p:pic>
-    </p:spTree>
-    <p:extLst>
-      <p:ext uri="{BB962C8B-B14F-4D97-AF65-F5344CB8AC3E}">
-        <p14:creationId xmlns:p14="http://schemas.microsoft.com/office/powerpoint/2010/main" val="142988974"/>
-      </p:ext>
-    </p:extLst>
-  </p:cSld>
-  <p:clrMapOvr>
-    <a:masterClrMapping/>
-  </p:clrMapOvr>
-  <p:timing>
-    <p:tnLst>
-      <p:par>
-        <p:cTn id="1" dur="indefinite" restart="never" nodeType="tmRoot"/>
-      </p:par>
-    </p:tnLst>
-  </p:timing>
-</p:sld>
-</file>
-
-<file path=ppt/slides/slide15.xml><?xml version="1.0" encoding="utf-8"?>
-<p:sld xmlns:a="http://schemas.openxmlformats.org/drawingml/2006/main" xmlns:r="http://schemas.openxmlformats.org/officeDocument/2006/relationships" xmlns:p="http://schemas.openxmlformats.org/presentationml/2006/main">
-  <p:cSld>
-    <p:spTree>
-      <p:nvGrpSpPr>
-        <p:cNvPr id="1" name=""/>
-        <p:cNvGrpSpPr/>
-        <p:nvPr/>
-      </p:nvGrpSpPr>
-      <p:grpSpPr>
-        <a:xfrm>
-          <a:off x="0" y="0"/>
-          <a:ext cx="0" cy="0"/>
-          <a:chOff x="0" y="0"/>
-          <a:chExt cx="0" cy="0"/>
-        </a:xfrm>
-      </p:grpSpPr>
-      <p:sp>
-        <p:nvSpPr>
-          <p:cNvPr id="2" name="Title 1"/>
-          <p:cNvSpPr>
-            <a:spLocks noGrp="1"/>
-          </p:cNvSpPr>
-          <p:nvPr>
-            <p:ph type="title"/>
-          </p:nvPr>
-        </p:nvSpPr>
-        <p:spPr>
-          <a:xfrm>
-            <a:off x="838200" y="365125"/>
-            <a:ext cx="10515600" cy="208081"/>
-          </a:xfrm>
-        </p:spPr>
-        <p:txBody>
-          <a:bodyPr>
-            <a:normAutofit fontScale="90000"/>
-          </a:bodyPr>
-          <a:lstStyle/>
-          <a:p>
-            <a:pPr algn="ctr">
-              <a:lnSpc>
-                <a:spcPct val="100000"/>
-              </a:lnSpc>
-              <a:spcBef>
-                <a:spcPts val="1200"/>
-              </a:spcBef>
-              <a:spcAft>
-                <a:spcPts val="1200"/>
-              </a:spcAft>
-            </a:pPr>
-            <a:r>
-              <a:rPr lang="en-US" sz="3000" dirty="0" smtClean="0">
-                <a:solidFill>
-                  <a:srgbClr val="0070C0"/>
-                </a:solidFill>
-                <a:latin typeface="Century Gothic" panose="020B0502020202020204" pitchFamily="34" charset="0"/>
-                <a:ea typeface="+mn-ea"/>
-                <a:cs typeface="+mn-cs"/>
-              </a:rPr>
-              <a:t>Progress of Reinstallation of Regulator (Rehab-</a:t>
-            </a:r>
-            <a:r>
-              <a:rPr lang="en-US" sz="3000" dirty="0" err="1" smtClean="0">
-                <a:solidFill>
-                  <a:srgbClr val="0070C0"/>
-                </a:solidFill>
-                <a:latin typeface="Century Gothic" panose="020B0502020202020204" pitchFamily="34" charset="0"/>
-                <a:ea typeface="+mn-ea"/>
-                <a:cs typeface="+mn-cs"/>
-              </a:rPr>
-              <a:t>Haor</a:t>
-            </a:r>
-            <a:r>
-              <a:rPr lang="en-US" sz="3000" dirty="0" smtClean="0">
-                <a:solidFill>
-                  <a:srgbClr val="0070C0"/>
-                </a:solidFill>
-                <a:latin typeface="Century Gothic" panose="020B0502020202020204" pitchFamily="34" charset="0"/>
-                <a:ea typeface="+mn-ea"/>
-                <a:cs typeface="+mn-cs"/>
-              </a:rPr>
-              <a:t>)</a:t>
-            </a:r>
-            <a:endParaRPr lang="en-US" sz="3000" dirty="0">
-              <a:solidFill>
-                <a:srgbClr val="0070C0"/>
-              </a:solidFill>
-              <a:latin typeface="Century Gothic" panose="020B0502020202020204" pitchFamily="34" charset="0"/>
-              <a:ea typeface="+mn-ea"/>
-              <a:cs typeface="+mn-cs"/>
-            </a:endParaRPr>
-          </a:p>
-        </p:txBody>
-      </p:sp>
-      <p:sp>
-        <p:nvSpPr>
-          <p:cNvPr id="4" name="Slide Number Placeholder 3"/>
-          <p:cNvSpPr>
-            <a:spLocks noGrp="1"/>
-          </p:cNvSpPr>
-          <p:nvPr>
-            <p:ph type="sldNum" sz="quarter" idx="12"/>
-          </p:nvPr>
-        </p:nvSpPr>
-        <p:spPr/>
-        <p:txBody>
-          <a:bodyPr/>
-          <a:lstStyle/>
-          <a:p>
-            <a:fld id="{826EFCA3-36E9-4263-A920-02DD3CA5B069}" type="slidenum">
-              <a:rPr lang="en-CA" smtClean="0"/>
-              <a:pPr/>
-              <a:t>15</a:t>
-            </a:fld>
-            <a:endParaRPr lang="en-CA" dirty="0"/>
-          </a:p>
-        </p:txBody>
-      </p:sp>
-      <p:sp>
-        <p:nvSpPr>
-          <p:cNvPr id="3" name="Content Placeholder 2"/>
-          <p:cNvSpPr>
-            <a:spLocks noGrp="1"/>
-          </p:cNvSpPr>
-          <p:nvPr>
-            <p:ph idx="1"/>
-          </p:nvPr>
-        </p:nvSpPr>
-        <p:spPr/>
-        <p:txBody>
-          <a:bodyPr/>
-          <a:lstStyle/>
-          <a:p>
-            <a:endParaRPr lang="en-US"/>
-          </a:p>
-        </p:txBody>
-      </p:sp>
-      <p:pic>
-        <p:nvPicPr>
-          <p:cNvPr id="16396" name="Picture 12" descr="F:\Downloads\fwddataforppt\Reg_Re_inst.jpg"/>
-          <p:cNvPicPr>
-            <a:picLocks noChangeAspect="1" noChangeArrowheads="1"/>
-          </p:cNvPicPr>
-          <p:nvPr/>
-        </p:nvPicPr>
-        <p:blipFill>
-          <a:blip r:embed="rId2">
-            <a:extLst>
-              <a:ext uri="{28A0092B-C50C-407E-A947-70E740481C1C}">
-                <a14:useLocalDpi xmlns:a14="http://schemas.microsoft.com/office/drawing/2010/main" val="0"/>
-              </a:ext>
-            </a:extLst>
-          </a:blip>
-          <a:srcRect/>
-          <a:stretch>
-            <a:fillRect/>
-          </a:stretch>
-        </p:blipFill>
-        <p:spPr bwMode="auto">
-          <a:xfrm>
-            <a:off x="341621" y="673100"/>
-            <a:ext cx="11589824" cy="5668706"/>
-          </a:xfrm>
-          <a:prstGeom prst="rect">
-            <a:avLst/>
-          </a:prstGeom>
-          <a:noFill/>
-          <a:extLst>
-            <a:ext uri="{909E8E84-426E-40DD-AFC4-6F175D3DCCD1}">
-              <a14:hiddenFill xmlns:a14="http://schemas.microsoft.com/office/drawing/2010/main">
-                <a:solidFill>
-                  <a:srgbClr val="FFFFFF"/>
-                </a:solidFill>
-              </a14:hiddenFill>
-            </a:ext>
-          </a:extLst>
-        </p:spPr>
-      </p:pic>
-    </p:spTree>
-    <p:extLst>
-      <p:ext uri="{BB962C8B-B14F-4D97-AF65-F5344CB8AC3E}">
-        <p14:creationId xmlns:p14="http://schemas.microsoft.com/office/powerpoint/2010/main" val="766726360"/>
-      </p:ext>
-    </p:extLst>
-  </p:cSld>
-  <p:clrMapOvr>
-    <a:masterClrMapping/>
-  </p:clrMapOvr>
-  <p:timing>
-    <p:tnLst>
-      <p:par>
-        <p:cTn id="1" dur="indefinite" restart="never" nodeType="tmRoot"/>
-      </p:par>
-    </p:tnLst>
-  </p:timing>
-</p:sld>
-</file>
-
-<file path=ppt/slides/slide16.xml><?xml version="1.0" encoding="utf-8"?>
-<p:sld xmlns:a="http://schemas.openxmlformats.org/drawingml/2006/main" xmlns:r="http://schemas.openxmlformats.org/officeDocument/2006/relationships" xmlns:p="http://schemas.openxmlformats.org/presentationml/2006/main">
-  <p:cSld>
-    <p:spTree>
-      <p:nvGrpSpPr>
-        <p:cNvPr id="1" name=""/>
-        <p:cNvGrpSpPr/>
-        <p:nvPr/>
-      </p:nvGrpSpPr>
-      <p:grpSpPr>
-        <a:xfrm>
-          <a:off x="0" y="0"/>
-          <a:ext cx="0" cy="0"/>
-          <a:chOff x="0" y="0"/>
-          <a:chExt cx="0" cy="0"/>
-        </a:xfrm>
-      </p:grpSpPr>
-      <p:sp>
-        <p:nvSpPr>
-          <p:cNvPr id="2" name="Title 1"/>
-          <p:cNvSpPr>
-            <a:spLocks noGrp="1"/>
-          </p:cNvSpPr>
-          <p:nvPr>
-            <p:ph type="title"/>
-          </p:nvPr>
-        </p:nvSpPr>
-        <p:spPr/>
-        <p:txBody>
-          <a:bodyPr>
-            <a:normAutofit/>
-          </a:bodyPr>
-          <a:lstStyle/>
-          <a:p>
-            <a:pPr algn="ctr">
-              <a:lnSpc>
-                <a:spcPct val="100000"/>
-              </a:lnSpc>
-              <a:spcBef>
-                <a:spcPts val="1200"/>
-              </a:spcBef>
-              <a:spcAft>
-                <a:spcPts val="1200"/>
-              </a:spcAft>
-            </a:pPr>
-            <a:r>
-              <a:rPr lang="en-US" sz="3000" dirty="0" smtClean="0">
-                <a:solidFill>
-                  <a:srgbClr val="0070C0"/>
-                </a:solidFill>
-                <a:latin typeface="Century Gothic" panose="020B0502020202020204" pitchFamily="34" charset="0"/>
-                <a:ea typeface="+mn-ea"/>
-                <a:cs typeface="+mn-cs"/>
-              </a:rPr>
-              <a:t>Progress of Construction of Regulator/Causeway/Box Drainage Outlet</a:t>
-            </a:r>
-            <a:endParaRPr lang="en-US" sz="3000" dirty="0">
-              <a:solidFill>
-                <a:srgbClr val="0070C0"/>
-              </a:solidFill>
-              <a:latin typeface="Century Gothic" panose="020B0502020202020204" pitchFamily="34" charset="0"/>
-              <a:ea typeface="+mn-ea"/>
-              <a:cs typeface="+mn-cs"/>
-            </a:endParaRPr>
-          </a:p>
-        </p:txBody>
-      </p:sp>
-      <p:sp>
-        <p:nvSpPr>
-          <p:cNvPr id="4" name="Slide Number Placeholder 3"/>
-          <p:cNvSpPr>
-            <a:spLocks noGrp="1"/>
-          </p:cNvSpPr>
-          <p:nvPr>
-            <p:ph type="sldNum" sz="quarter" idx="12"/>
-          </p:nvPr>
-        </p:nvSpPr>
-        <p:spPr/>
-        <p:txBody>
-          <a:bodyPr/>
-          <a:lstStyle/>
-          <a:p>
-            <a:fld id="{826EFCA3-36E9-4263-A920-02DD3CA5B069}" type="slidenum">
-              <a:rPr lang="en-CA" smtClean="0"/>
-              <a:pPr/>
-              <a:t>16</a:t>
-            </a:fld>
-            <a:endParaRPr lang="en-CA" dirty="0"/>
-          </a:p>
-        </p:txBody>
-      </p:sp>
-      <p:sp>
-        <p:nvSpPr>
-          <p:cNvPr id="3" name="Content Placeholder 2"/>
-          <p:cNvSpPr>
-            <a:spLocks noGrp="1"/>
-          </p:cNvSpPr>
-          <p:nvPr>
-            <p:ph idx="1"/>
-          </p:nvPr>
-        </p:nvSpPr>
-        <p:spPr/>
-        <p:txBody>
-          <a:bodyPr/>
-          <a:lstStyle/>
-          <a:p>
-            <a:endParaRPr lang="en-US"/>
-          </a:p>
-        </p:txBody>
-      </p:sp>
-      <p:pic>
-        <p:nvPicPr>
-          <p:cNvPr id="17420" name="Picture 12" descr="F:\Downloads\fwddataforppt\Cons_Struc.jpg"/>
-          <p:cNvPicPr>
-            <a:picLocks noChangeAspect="1" noChangeArrowheads="1"/>
-          </p:cNvPicPr>
-          <p:nvPr/>
-        </p:nvPicPr>
-        <p:blipFill>
-          <a:blip r:embed="rId2">
-            <a:extLst>
-              <a:ext uri="{28A0092B-C50C-407E-A947-70E740481C1C}">
-                <a14:useLocalDpi xmlns:a14="http://schemas.microsoft.com/office/drawing/2010/main" val="0"/>
-              </a:ext>
-            </a:extLst>
-          </a:blip>
-          <a:srcRect/>
-          <a:stretch>
-            <a:fillRect/>
-          </a:stretch>
-        </p:blipFill>
-        <p:spPr bwMode="auto">
-          <a:xfrm>
-            <a:off x="530942" y="1076428"/>
-            <a:ext cx="11223523" cy="5279922"/>
-          </a:xfrm>
-          <a:prstGeom prst="rect">
-            <a:avLst/>
-          </a:prstGeom>
-          <a:noFill/>
-          <a:extLst>
-            <a:ext uri="{909E8E84-426E-40DD-AFC4-6F175D3DCCD1}">
-              <a14:hiddenFill xmlns:a14="http://schemas.microsoft.com/office/drawing/2010/main">
-                <a:solidFill>
-                  <a:srgbClr val="FFFFFF"/>
-                </a:solidFill>
-              </a14:hiddenFill>
-            </a:ext>
-          </a:extLst>
-        </p:spPr>
-      </p:pic>
-    </p:spTree>
-    <p:extLst>
-      <p:ext uri="{BB962C8B-B14F-4D97-AF65-F5344CB8AC3E}">
-        <p14:creationId xmlns:p14="http://schemas.microsoft.com/office/powerpoint/2010/main" val="1997630968"/>
-      </p:ext>
-    </p:extLst>
-  </p:cSld>
-  <p:clrMapOvr>
-    <a:masterClrMapping/>
-  </p:clrMapOvr>
-  <p:timing>
-    <p:tnLst>
-      <p:par>
-        <p:cTn id="1" dur="indefinite" restart="never" nodeType="tmRoot"/>
-      </p:par>
-    </p:tnLst>
-  </p:timing>
-</p:sld>
-</file>
-
-<file path=ppt/slides/slide17.xml><?xml version="1.0" encoding="utf-8"?>
-<p:sld xmlns:a="http://schemas.openxmlformats.org/drawingml/2006/main" xmlns:r="http://schemas.openxmlformats.org/officeDocument/2006/relationships" xmlns:p="http://schemas.openxmlformats.org/presentationml/2006/main">
-  <p:cSld>
-    <p:spTree>
-      <p:nvGrpSpPr>
-        <p:cNvPr id="1" name=""/>
-        <p:cNvGrpSpPr/>
-        <p:nvPr/>
-      </p:nvGrpSpPr>
-      <p:grpSpPr>
-        <a:xfrm>
-          <a:off x="0" y="0"/>
-          <a:ext cx="0" cy="0"/>
-          <a:chOff x="0" y="0"/>
-          <a:chExt cx="0" cy="0"/>
-        </a:xfrm>
-      </p:grpSpPr>
-      <p:sp>
-        <p:nvSpPr>
-          <p:cNvPr id="2" name="Title 1"/>
-          <p:cNvSpPr>
-            <a:spLocks noGrp="1"/>
-          </p:cNvSpPr>
-          <p:nvPr>
-            <p:ph type="title"/>
-          </p:nvPr>
-        </p:nvSpPr>
-        <p:spPr/>
-        <p:txBody>
-          <a:bodyPr>
-            <a:normAutofit/>
-          </a:bodyPr>
-          <a:lstStyle/>
-          <a:p>
-            <a:pPr algn="ctr">
-              <a:lnSpc>
-                <a:spcPct val="100000"/>
-              </a:lnSpc>
-              <a:spcBef>
-                <a:spcPts val="1200"/>
-              </a:spcBef>
-              <a:spcAft>
-                <a:spcPts val="1200"/>
-              </a:spcAft>
-            </a:pPr>
-            <a:r>
-              <a:rPr lang="en-US" sz="3000" dirty="0" smtClean="0">
-                <a:solidFill>
-                  <a:srgbClr val="0070C0"/>
-                </a:solidFill>
-                <a:latin typeface="Century Gothic" panose="020B0502020202020204" pitchFamily="34" charset="0"/>
-                <a:ea typeface="+mn-ea"/>
-                <a:cs typeface="+mn-cs"/>
-              </a:rPr>
-              <a:t>Progress of  Repair of </a:t>
-            </a:r>
-            <a:r>
-              <a:rPr lang="en-US" sz="3000" dirty="0">
-                <a:solidFill>
-                  <a:srgbClr val="0070C0"/>
-                </a:solidFill>
-                <a:latin typeface="Century Gothic" panose="020B0502020202020204" pitchFamily="34" charset="0"/>
-                <a:ea typeface="+mn-ea"/>
-                <a:cs typeface="+mn-cs"/>
-              </a:rPr>
-              <a:t>Full Embankment </a:t>
-            </a:r>
-            <a:r>
-              <a:rPr lang="en-US" sz="3000" dirty="0" smtClean="0">
-                <a:solidFill>
-                  <a:srgbClr val="0070C0"/>
-                </a:solidFill>
-                <a:latin typeface="Century Gothic" panose="020B0502020202020204" pitchFamily="34" charset="0"/>
-                <a:ea typeface="+mn-ea"/>
-                <a:cs typeface="+mn-cs"/>
-              </a:rPr>
-              <a:t>                 (</a:t>
-            </a:r>
-            <a:r>
-              <a:rPr lang="en-US" sz="3000" dirty="0">
-                <a:solidFill>
-                  <a:srgbClr val="0070C0"/>
-                </a:solidFill>
-                <a:latin typeface="Century Gothic" panose="020B0502020202020204" pitchFamily="34" charset="0"/>
-                <a:ea typeface="+mn-ea"/>
-                <a:cs typeface="+mn-cs"/>
-              </a:rPr>
-              <a:t>Rehab </a:t>
-            </a:r>
-            <a:r>
-              <a:rPr lang="en-US" sz="3000" dirty="0" err="1">
-                <a:solidFill>
-                  <a:srgbClr val="0070C0"/>
-                </a:solidFill>
-                <a:latin typeface="Century Gothic" panose="020B0502020202020204" pitchFamily="34" charset="0"/>
-                <a:ea typeface="+mn-ea"/>
-                <a:cs typeface="+mn-cs"/>
-              </a:rPr>
-              <a:t>Haor</a:t>
-            </a:r>
-            <a:r>
-              <a:rPr lang="en-US" sz="3000" dirty="0">
-                <a:solidFill>
-                  <a:srgbClr val="0070C0"/>
-                </a:solidFill>
-                <a:latin typeface="Century Gothic" panose="020B0502020202020204" pitchFamily="34" charset="0"/>
-                <a:ea typeface="+mn-ea"/>
-                <a:cs typeface="+mn-cs"/>
-              </a:rPr>
-              <a:t>) </a:t>
-            </a:r>
-          </a:p>
-        </p:txBody>
-      </p:sp>
-      <p:sp>
-        <p:nvSpPr>
-          <p:cNvPr id="4" name="Slide Number Placeholder 3"/>
-          <p:cNvSpPr>
-            <a:spLocks noGrp="1"/>
-          </p:cNvSpPr>
-          <p:nvPr>
-            <p:ph type="sldNum" sz="quarter" idx="12"/>
-          </p:nvPr>
-        </p:nvSpPr>
-        <p:spPr/>
-        <p:txBody>
-          <a:bodyPr/>
-          <a:lstStyle/>
-          <a:p>
-            <a:fld id="{826EFCA3-36E9-4263-A920-02DD3CA5B069}" type="slidenum">
-              <a:rPr lang="en-CA" smtClean="0"/>
-              <a:pPr/>
-              <a:t>17</a:t>
-            </a:fld>
-            <a:endParaRPr lang="en-CA" dirty="0"/>
-          </a:p>
-        </p:txBody>
-      </p:sp>
-      <p:sp>
-        <p:nvSpPr>
-          <p:cNvPr id="3" name="Content Placeholder 2"/>
-          <p:cNvSpPr>
-            <a:spLocks noGrp="1"/>
-          </p:cNvSpPr>
-          <p:nvPr>
-            <p:ph idx="1"/>
-          </p:nvPr>
-        </p:nvSpPr>
-        <p:spPr/>
-        <p:txBody>
-          <a:bodyPr/>
-          <a:lstStyle/>
-          <a:p>
-            <a:endParaRPr lang="en-US"/>
-          </a:p>
-        </p:txBody>
-      </p:sp>
-      <p:pic>
-        <p:nvPicPr>
-          <p:cNvPr id="20492" name="Picture 12" descr="F:\Downloads\fwddataforppt\Full_Emb_Rep.jpg"/>
-          <p:cNvPicPr>
-            <a:picLocks noChangeAspect="1" noChangeArrowheads="1"/>
-          </p:cNvPicPr>
-          <p:nvPr/>
-        </p:nvPicPr>
-        <p:blipFill>
-          <a:blip r:embed="rId2">
-            <a:extLst>
-              <a:ext uri="{28A0092B-C50C-407E-A947-70E740481C1C}">
-                <a14:useLocalDpi xmlns:a14="http://schemas.microsoft.com/office/drawing/2010/main" val="0"/>
-              </a:ext>
-            </a:extLst>
-          </a:blip>
-          <a:srcRect/>
-          <a:stretch>
-            <a:fillRect/>
-          </a:stretch>
-        </p:blipFill>
-        <p:spPr bwMode="auto">
-          <a:xfrm>
-            <a:off x="221226" y="1592826"/>
-            <a:ext cx="11547987" cy="4590487"/>
-          </a:xfrm>
-          <a:prstGeom prst="rect">
-            <a:avLst/>
-          </a:prstGeom>
-          <a:noFill/>
-          <a:extLst>
-            <a:ext uri="{909E8E84-426E-40DD-AFC4-6F175D3DCCD1}">
-              <a14:hiddenFill xmlns:a14="http://schemas.microsoft.com/office/drawing/2010/main">
-                <a:solidFill>
-                  <a:srgbClr val="FFFFFF"/>
-                </a:solidFill>
-              </a14:hiddenFill>
-            </a:ext>
-          </a:extLst>
-        </p:spPr>
-      </p:pic>
-    </p:spTree>
-    <p:extLst>
-      <p:ext uri="{BB962C8B-B14F-4D97-AF65-F5344CB8AC3E}">
-        <p14:creationId xmlns:p14="http://schemas.microsoft.com/office/powerpoint/2010/main" val="1263697976"/>
-      </p:ext>
-    </p:extLst>
-  </p:cSld>
-  <p:clrMapOvr>
-    <a:masterClrMapping/>
-  </p:clrMapOvr>
-  <p:timing>
-    <p:tnLst>
-      <p:par>
-        <p:cTn id="1" dur="indefinite" restart="never" nodeType="tmRoot"/>
-      </p:par>
-    </p:tnLst>
-  </p:timing>
-</p:sld>
-</file>
-
-<file path=ppt/slides/slide18.xml><?xml version="1.0" encoding="utf-8"?>
-<p:sld xmlns:a="http://schemas.openxmlformats.org/drawingml/2006/main" xmlns:r="http://schemas.openxmlformats.org/officeDocument/2006/relationships" xmlns:p="http://schemas.openxmlformats.org/presentationml/2006/main">
-  <p:cSld>
-    <p:spTree>
-      <p:nvGrpSpPr>
-        <p:cNvPr id="1" name=""/>
-        <p:cNvGrpSpPr/>
-        <p:nvPr/>
-      </p:nvGrpSpPr>
-      <p:grpSpPr>
-        <a:xfrm>
-          <a:off x="0" y="0"/>
-          <a:ext cx="0" cy="0"/>
-          <a:chOff x="0" y="0"/>
-          <a:chExt cx="0" cy="0"/>
-        </a:xfrm>
-      </p:grpSpPr>
-      <p:sp>
-        <p:nvSpPr>
-          <p:cNvPr id="2" name="Title 1"/>
-          <p:cNvSpPr>
-            <a:spLocks noGrp="1"/>
-          </p:cNvSpPr>
-          <p:nvPr>
-            <p:ph type="title"/>
-          </p:nvPr>
-        </p:nvSpPr>
-        <p:spPr/>
-        <p:txBody>
-          <a:bodyPr>
-            <a:normAutofit/>
-          </a:bodyPr>
-          <a:lstStyle/>
-          <a:p>
-            <a:pPr algn="ctr">
-              <a:lnSpc>
-                <a:spcPct val="100000"/>
-              </a:lnSpc>
-              <a:spcBef>
-                <a:spcPts val="1200"/>
-              </a:spcBef>
-              <a:spcAft>
-                <a:spcPts val="1200"/>
-              </a:spcAft>
-            </a:pPr>
-            <a:r>
-              <a:rPr lang="en-US" sz="3000" dirty="0" smtClean="0">
-                <a:solidFill>
-                  <a:srgbClr val="0070C0"/>
-                </a:solidFill>
-                <a:latin typeface="Century Gothic" panose="020B0502020202020204" pitchFamily="34" charset="0"/>
-                <a:ea typeface="+mn-ea"/>
-                <a:cs typeface="+mn-cs"/>
-              </a:rPr>
-              <a:t>Progress of Rehab of Submersible Embankment                  (</a:t>
-            </a:r>
-            <a:r>
-              <a:rPr lang="en-US" sz="3000" dirty="0">
-                <a:solidFill>
-                  <a:srgbClr val="0070C0"/>
-                </a:solidFill>
-                <a:latin typeface="Century Gothic" panose="020B0502020202020204" pitchFamily="34" charset="0"/>
-                <a:ea typeface="+mn-ea"/>
-                <a:cs typeface="+mn-cs"/>
-              </a:rPr>
-              <a:t>Rehab </a:t>
-            </a:r>
-            <a:r>
-              <a:rPr lang="en-US" sz="3000" dirty="0" err="1">
-                <a:solidFill>
-                  <a:srgbClr val="0070C0"/>
-                </a:solidFill>
-                <a:latin typeface="Century Gothic" panose="020B0502020202020204" pitchFamily="34" charset="0"/>
-                <a:ea typeface="+mn-ea"/>
-                <a:cs typeface="+mn-cs"/>
-              </a:rPr>
-              <a:t>Haor</a:t>
-            </a:r>
-            <a:r>
-              <a:rPr lang="en-US" sz="3000" dirty="0">
-                <a:solidFill>
-                  <a:srgbClr val="0070C0"/>
-                </a:solidFill>
-                <a:latin typeface="Century Gothic" panose="020B0502020202020204" pitchFamily="34" charset="0"/>
-                <a:ea typeface="+mn-ea"/>
-                <a:cs typeface="+mn-cs"/>
-              </a:rPr>
-              <a:t>) </a:t>
-            </a:r>
-          </a:p>
-        </p:txBody>
-      </p:sp>
-      <p:sp>
-        <p:nvSpPr>
-          <p:cNvPr id="4" name="Slide Number Placeholder 3"/>
-          <p:cNvSpPr>
-            <a:spLocks noGrp="1"/>
-          </p:cNvSpPr>
-          <p:nvPr>
-            <p:ph type="sldNum" sz="quarter" idx="12"/>
-          </p:nvPr>
-        </p:nvSpPr>
-        <p:spPr/>
-        <p:txBody>
-          <a:bodyPr/>
-          <a:lstStyle/>
-          <a:p>
-            <a:fld id="{826EFCA3-36E9-4263-A920-02DD3CA5B069}" type="slidenum">
-              <a:rPr lang="en-CA" smtClean="0"/>
-              <a:pPr/>
-              <a:t>18</a:t>
-            </a:fld>
-            <a:endParaRPr lang="en-CA" dirty="0"/>
-          </a:p>
-        </p:txBody>
-      </p:sp>
-      <p:sp>
-        <p:nvSpPr>
-          <p:cNvPr id="3" name="Content Placeholder 2"/>
-          <p:cNvSpPr>
-            <a:spLocks noGrp="1"/>
-          </p:cNvSpPr>
-          <p:nvPr>
-            <p:ph idx="1"/>
-          </p:nvPr>
-        </p:nvSpPr>
-        <p:spPr/>
-        <p:txBody>
-          <a:bodyPr/>
-          <a:lstStyle/>
-          <a:p>
-            <a:endParaRPr lang="en-US"/>
-          </a:p>
-        </p:txBody>
-      </p:sp>
-      <p:pic>
-        <p:nvPicPr>
-          <p:cNvPr id="21518" name="Picture 14" descr="F:\Downloads\fwddataforppt\Sub_Emb_Rep.jpg"/>
-          <p:cNvPicPr>
-            <a:picLocks noChangeAspect="1" noChangeArrowheads="1"/>
-          </p:cNvPicPr>
-          <p:nvPr/>
-        </p:nvPicPr>
-        <p:blipFill>
-          <a:blip r:embed="rId2">
-            <a:extLst>
-              <a:ext uri="{28A0092B-C50C-407E-A947-70E740481C1C}">
-                <a14:useLocalDpi xmlns:a14="http://schemas.microsoft.com/office/drawing/2010/main" val="0"/>
-              </a:ext>
-            </a:extLst>
-          </a:blip>
-          <a:srcRect/>
-          <a:stretch>
-            <a:fillRect/>
-          </a:stretch>
-        </p:blipFill>
-        <p:spPr bwMode="auto">
-          <a:xfrm>
-            <a:off x="191729" y="1578077"/>
-            <a:ext cx="11606981" cy="4605236"/>
-          </a:xfrm>
-          <a:prstGeom prst="rect">
-            <a:avLst/>
-          </a:prstGeom>
-          <a:noFill/>
-          <a:extLst>
-            <a:ext uri="{909E8E84-426E-40DD-AFC4-6F175D3DCCD1}">
-              <a14:hiddenFill xmlns:a14="http://schemas.microsoft.com/office/drawing/2010/main">
-                <a:solidFill>
-                  <a:srgbClr val="FFFFFF"/>
-                </a:solidFill>
-              </a14:hiddenFill>
-            </a:ext>
-          </a:extLst>
-        </p:spPr>
-      </p:pic>
-    </p:spTree>
-    <p:extLst>
-      <p:ext uri="{BB962C8B-B14F-4D97-AF65-F5344CB8AC3E}">
-        <p14:creationId xmlns:p14="http://schemas.microsoft.com/office/powerpoint/2010/main" val="248331411"/>
-      </p:ext>
-    </p:extLst>
-  </p:cSld>
-  <p:clrMapOvr>
-    <a:masterClrMapping/>
-  </p:clrMapOvr>
-  <p:timing>
-    <p:tnLst>
-      <p:par>
-        <p:cTn id="1" dur="indefinite" restart="never" nodeType="tmRoot"/>
-      </p:par>
-    </p:tnLst>
-  </p:timing>
-</p:sld>
-</file>
-
-<file path=ppt/slides/slide19.xml><?xml version="1.0" encoding="utf-8"?>
-<p:sld xmlns:a="http://schemas.openxmlformats.org/drawingml/2006/main" xmlns:r="http://schemas.openxmlformats.org/officeDocument/2006/relationships" xmlns:p="http://schemas.openxmlformats.org/presentationml/2006/main">
-  <p:cSld>
-    <p:spTree>
-      <p:nvGrpSpPr>
-        <p:cNvPr id="1" name=""/>
-        <p:cNvGrpSpPr/>
-        <p:nvPr/>
-      </p:nvGrpSpPr>
-      <p:grpSpPr>
-        <a:xfrm>
-          <a:off x="0" y="0"/>
-          <a:ext cx="0" cy="0"/>
-          <a:chOff x="0" y="0"/>
-          <a:chExt cx="0" cy="0"/>
-        </a:xfrm>
-      </p:grpSpPr>
-      <p:sp>
-        <p:nvSpPr>
-          <p:cNvPr id="2" name="Title 1"/>
-          <p:cNvSpPr>
-            <a:spLocks noGrp="1"/>
-          </p:cNvSpPr>
-          <p:nvPr>
-            <p:ph type="title"/>
-          </p:nvPr>
-        </p:nvSpPr>
-        <p:spPr/>
-        <p:txBody>
-          <a:bodyPr>
-            <a:normAutofit/>
-          </a:bodyPr>
-          <a:lstStyle/>
-          <a:p>
-            <a:pPr algn="ctr">
-              <a:lnSpc>
-                <a:spcPct val="100000"/>
-              </a:lnSpc>
-              <a:spcBef>
-                <a:spcPts val="1200"/>
-              </a:spcBef>
-              <a:spcAft>
-                <a:spcPts val="1200"/>
-              </a:spcAft>
-            </a:pPr>
-            <a:r>
-              <a:rPr lang="en-US" sz="3000" dirty="0" smtClean="0">
-                <a:solidFill>
-                  <a:srgbClr val="0070C0"/>
-                </a:solidFill>
-                <a:latin typeface="Century Gothic" panose="020B0502020202020204" pitchFamily="34" charset="0"/>
-                <a:ea typeface="+mn-ea"/>
-                <a:cs typeface="+mn-cs"/>
-              </a:rPr>
-              <a:t>Progress of Rehabilitation of Regulator(New </a:t>
-            </a:r>
-            <a:r>
-              <a:rPr lang="en-US" sz="3000" dirty="0" err="1" smtClean="0">
-                <a:solidFill>
-                  <a:srgbClr val="0070C0"/>
-                </a:solidFill>
-                <a:latin typeface="Century Gothic" panose="020B0502020202020204" pitchFamily="34" charset="0"/>
-                <a:ea typeface="+mn-ea"/>
-                <a:cs typeface="+mn-cs"/>
-              </a:rPr>
-              <a:t>Haor</a:t>
-            </a:r>
-            <a:r>
-              <a:rPr lang="en-US" sz="3000" dirty="0" smtClean="0">
-                <a:solidFill>
-                  <a:srgbClr val="0070C0"/>
-                </a:solidFill>
-                <a:latin typeface="Century Gothic" panose="020B0502020202020204" pitchFamily="34" charset="0"/>
-                <a:ea typeface="+mn-ea"/>
-                <a:cs typeface="+mn-cs"/>
-              </a:rPr>
-              <a:t>) </a:t>
-            </a:r>
-            <a:endParaRPr lang="en-US" sz="3000" dirty="0">
-              <a:solidFill>
-                <a:srgbClr val="0070C0"/>
-              </a:solidFill>
-              <a:latin typeface="Century Gothic" panose="020B0502020202020204" pitchFamily="34" charset="0"/>
-              <a:ea typeface="+mn-ea"/>
-              <a:cs typeface="+mn-cs"/>
-            </a:endParaRPr>
-          </a:p>
-        </p:txBody>
-      </p:sp>
-      <p:sp>
-        <p:nvSpPr>
-          <p:cNvPr id="4" name="Slide Number Placeholder 3"/>
-          <p:cNvSpPr>
-            <a:spLocks noGrp="1"/>
-          </p:cNvSpPr>
-          <p:nvPr>
-            <p:ph type="sldNum" sz="quarter" idx="12"/>
-          </p:nvPr>
-        </p:nvSpPr>
-        <p:spPr/>
-        <p:txBody>
-          <a:bodyPr/>
-          <a:lstStyle/>
-          <a:p>
-            <a:fld id="{826EFCA3-36E9-4263-A920-02DD3CA5B069}" type="slidenum">
-              <a:rPr lang="en-CA" smtClean="0"/>
-              <a:pPr/>
-              <a:t>19</a:t>
-            </a:fld>
-            <a:endParaRPr lang="en-CA" dirty="0"/>
-          </a:p>
-        </p:txBody>
-      </p:sp>
-      <p:sp>
-        <p:nvSpPr>
-          <p:cNvPr id="3" name="Content Placeholder 2"/>
-          <p:cNvSpPr>
-            <a:spLocks noGrp="1"/>
-          </p:cNvSpPr>
-          <p:nvPr>
-            <p:ph idx="1"/>
-          </p:nvPr>
-        </p:nvSpPr>
-        <p:spPr/>
-        <p:txBody>
-          <a:bodyPr/>
-          <a:lstStyle/>
-          <a:p>
-            <a:endParaRPr lang="en-US"/>
-          </a:p>
-        </p:txBody>
-      </p:sp>
-      <p:pic>
-        <p:nvPicPr>
-          <p:cNvPr id="24593" name="Picture 17" descr="F:\Downloads\fwddataforppt\Reg_Rehab.jpg"/>
-          <p:cNvPicPr>
-            <a:picLocks noChangeAspect="1" noChangeArrowheads="1"/>
-          </p:cNvPicPr>
-          <p:nvPr/>
-        </p:nvPicPr>
-        <p:blipFill>
-          <a:blip r:embed="rId2">
-            <a:extLst>
-              <a:ext uri="{28A0092B-C50C-407E-A947-70E740481C1C}">
-                <a14:useLocalDpi xmlns:a14="http://schemas.microsoft.com/office/drawing/2010/main" val="0"/>
-              </a:ext>
-            </a:extLst>
-          </a:blip>
-          <a:srcRect/>
-          <a:stretch>
-            <a:fillRect/>
-          </a:stretch>
-        </p:blipFill>
-        <p:spPr bwMode="auto">
-          <a:xfrm>
-            <a:off x="294968" y="1474838"/>
-            <a:ext cx="11606980" cy="4852219"/>
-          </a:xfrm>
-          <a:prstGeom prst="rect">
-            <a:avLst/>
-          </a:prstGeom>
-          <a:noFill/>
-          <a:extLst>
-            <a:ext uri="{909E8E84-426E-40DD-AFC4-6F175D3DCCD1}">
-              <a14:hiddenFill xmlns:a14="http://schemas.microsoft.com/office/drawing/2010/main">
-                <a:solidFill>
-                  <a:srgbClr val="FFFFFF"/>
-                </a:solidFill>
-              </a14:hiddenFill>
-            </a:ext>
-          </a:extLst>
-        </p:spPr>
-      </p:pic>
-    </p:spTree>
-    <p:extLst>
-      <p:ext uri="{BB962C8B-B14F-4D97-AF65-F5344CB8AC3E}">
-        <p14:creationId xmlns:p14="http://schemas.microsoft.com/office/powerpoint/2010/main" val="2361253911"/>
       </p:ext>
     </p:extLst>
   </p:cSld>
@@ -5301,534 +4551,6 @@
     <p:extLst>
       <p:ext uri="{BB962C8B-B14F-4D97-AF65-F5344CB8AC3E}">
         <p14:creationId xmlns:p14="http://schemas.microsoft.com/office/powerpoint/2010/main" val="4180436589"/>
-      </p:ext>
-    </p:extLst>
-  </p:cSld>
-  <p:clrMapOvr>
-    <a:masterClrMapping/>
-  </p:clrMapOvr>
-  <p:timing>
-    <p:tnLst>
-      <p:par>
-        <p:cTn id="1" dur="indefinite" restart="never" nodeType="tmRoot"/>
-      </p:par>
-    </p:tnLst>
-  </p:timing>
-</p:sld>
-</file>
-
-<file path=ppt/slides/slide20.xml><?xml version="1.0" encoding="utf-8"?>
-<p:sld xmlns:a="http://schemas.openxmlformats.org/drawingml/2006/main" xmlns:r="http://schemas.openxmlformats.org/officeDocument/2006/relationships" xmlns:p="http://schemas.openxmlformats.org/presentationml/2006/main">
-  <p:cSld>
-    <p:spTree>
-      <p:nvGrpSpPr>
-        <p:cNvPr id="1" name=""/>
-        <p:cNvGrpSpPr/>
-        <p:nvPr/>
-      </p:nvGrpSpPr>
-      <p:grpSpPr>
-        <a:xfrm>
-          <a:off x="0" y="0"/>
-          <a:ext cx="0" cy="0"/>
-          <a:chOff x="0" y="0"/>
-          <a:chExt cx="0" cy="0"/>
-        </a:xfrm>
-      </p:grpSpPr>
-      <p:sp>
-        <p:nvSpPr>
-          <p:cNvPr id="2" name="Title 1"/>
-          <p:cNvSpPr>
-            <a:spLocks noGrp="1"/>
-          </p:cNvSpPr>
-          <p:nvPr>
-            <p:ph type="title"/>
-          </p:nvPr>
-        </p:nvSpPr>
-        <p:spPr>
-          <a:xfrm>
-            <a:off x="838200" y="365125"/>
-            <a:ext cx="10515600" cy="841375"/>
-          </a:xfrm>
-        </p:spPr>
-        <p:txBody>
-          <a:bodyPr>
-            <a:normAutofit/>
-          </a:bodyPr>
-          <a:lstStyle/>
-          <a:p>
-            <a:pPr algn="ctr">
-              <a:lnSpc>
-                <a:spcPct val="100000"/>
-              </a:lnSpc>
-              <a:spcBef>
-                <a:spcPts val="1200"/>
-              </a:spcBef>
-              <a:spcAft>
-                <a:spcPts val="1200"/>
-              </a:spcAft>
-            </a:pPr>
-            <a:r>
-              <a:rPr lang="en-US" sz="3000" dirty="0" smtClean="0">
-                <a:solidFill>
-                  <a:srgbClr val="0070C0"/>
-                </a:solidFill>
-                <a:latin typeface="Century Gothic" panose="020B0502020202020204" pitchFamily="34" charset="0"/>
-                <a:ea typeface="+mn-ea"/>
-                <a:cs typeface="+mn-cs"/>
-              </a:rPr>
-              <a:t>Progress of Construction of WMG Office</a:t>
-            </a:r>
-            <a:endParaRPr lang="en-US" sz="3000" dirty="0">
-              <a:solidFill>
-                <a:srgbClr val="0070C0"/>
-              </a:solidFill>
-              <a:latin typeface="Century Gothic" panose="020B0502020202020204" pitchFamily="34" charset="0"/>
-              <a:ea typeface="+mn-ea"/>
-              <a:cs typeface="+mn-cs"/>
-            </a:endParaRPr>
-          </a:p>
-        </p:txBody>
-      </p:sp>
-      <p:sp>
-        <p:nvSpPr>
-          <p:cNvPr id="4" name="Slide Number Placeholder 3"/>
-          <p:cNvSpPr>
-            <a:spLocks noGrp="1"/>
-          </p:cNvSpPr>
-          <p:nvPr>
-            <p:ph type="sldNum" sz="quarter" idx="12"/>
-          </p:nvPr>
-        </p:nvSpPr>
-        <p:spPr/>
-        <p:txBody>
-          <a:bodyPr/>
-          <a:lstStyle/>
-          <a:p>
-            <a:fld id="{826EFCA3-36E9-4263-A920-02DD3CA5B069}" type="slidenum">
-              <a:rPr lang="en-CA" smtClean="0"/>
-              <a:pPr/>
-              <a:t>20</a:t>
-            </a:fld>
-            <a:endParaRPr lang="en-CA" dirty="0"/>
-          </a:p>
-        </p:txBody>
-      </p:sp>
-      <p:sp>
-        <p:nvSpPr>
-          <p:cNvPr id="3" name="Content Placeholder 2"/>
-          <p:cNvSpPr>
-            <a:spLocks noGrp="1"/>
-          </p:cNvSpPr>
-          <p:nvPr>
-            <p:ph idx="1"/>
-          </p:nvPr>
-        </p:nvSpPr>
-        <p:spPr/>
-        <p:txBody>
-          <a:bodyPr/>
-          <a:lstStyle/>
-          <a:p>
-            <a:endParaRPr lang="en-US"/>
-          </a:p>
-        </p:txBody>
-      </p:sp>
-      <p:pic>
-        <p:nvPicPr>
-          <p:cNvPr id="25618" name="Picture 18" descr="F:\Downloads\fwddataforppt\Wmg_bld_const.jpg"/>
-          <p:cNvPicPr>
-            <a:picLocks noChangeAspect="1" noChangeArrowheads="1"/>
-          </p:cNvPicPr>
-          <p:nvPr/>
-        </p:nvPicPr>
-        <p:blipFill>
-          <a:blip r:embed="rId2">
-            <a:extLst>
-              <a:ext uri="{28A0092B-C50C-407E-A947-70E740481C1C}">
-                <a14:useLocalDpi xmlns:a14="http://schemas.microsoft.com/office/drawing/2010/main" val="0"/>
-              </a:ext>
-            </a:extLst>
-          </a:blip>
-          <a:srcRect/>
-          <a:stretch>
-            <a:fillRect/>
-          </a:stretch>
-        </p:blipFill>
-        <p:spPr bwMode="auto">
-          <a:xfrm>
-            <a:off x="265471" y="1165123"/>
-            <a:ext cx="11533239" cy="5018189"/>
-          </a:xfrm>
-          <a:prstGeom prst="rect">
-            <a:avLst/>
-          </a:prstGeom>
-          <a:noFill/>
-          <a:extLst>
-            <a:ext uri="{909E8E84-426E-40DD-AFC4-6F175D3DCCD1}">
-              <a14:hiddenFill xmlns:a14="http://schemas.microsoft.com/office/drawing/2010/main">
-                <a:solidFill>
-                  <a:srgbClr val="FFFFFF"/>
-                </a:solidFill>
-              </a14:hiddenFill>
-            </a:ext>
-          </a:extLst>
-        </p:spPr>
-      </p:pic>
-    </p:spTree>
-    <p:extLst>
-      <p:ext uri="{BB962C8B-B14F-4D97-AF65-F5344CB8AC3E}">
-        <p14:creationId xmlns:p14="http://schemas.microsoft.com/office/powerpoint/2010/main" val="2128263304"/>
-      </p:ext>
-    </p:extLst>
-  </p:cSld>
-  <p:clrMapOvr>
-    <a:masterClrMapping/>
-  </p:clrMapOvr>
-  <p:timing>
-    <p:tnLst>
-      <p:par>
-        <p:cTn id="1" dur="indefinite" restart="never" nodeType="tmRoot"/>
-      </p:par>
-    </p:tnLst>
-  </p:timing>
-</p:sld>
-</file>
-
-<file path=ppt/slides/slide21.xml><?xml version="1.0" encoding="utf-8"?>
-<p:sld xmlns:a="http://schemas.openxmlformats.org/drawingml/2006/main" xmlns:r="http://schemas.openxmlformats.org/officeDocument/2006/relationships" xmlns:p="http://schemas.openxmlformats.org/presentationml/2006/main">
-  <p:cSld>
-    <p:spTree>
-      <p:nvGrpSpPr>
-        <p:cNvPr id="1" name=""/>
-        <p:cNvGrpSpPr/>
-        <p:nvPr/>
-      </p:nvGrpSpPr>
-      <p:grpSpPr>
-        <a:xfrm>
-          <a:off x="0" y="0"/>
-          <a:ext cx="0" cy="0"/>
-          <a:chOff x="0" y="0"/>
-          <a:chExt cx="0" cy="0"/>
-        </a:xfrm>
-      </p:grpSpPr>
-      <p:sp>
-        <p:nvSpPr>
-          <p:cNvPr id="2" name="Title 1"/>
-          <p:cNvSpPr>
-            <a:spLocks noGrp="1"/>
-          </p:cNvSpPr>
-          <p:nvPr>
-            <p:ph type="title"/>
-          </p:nvPr>
-        </p:nvSpPr>
-        <p:spPr>
-          <a:xfrm>
-            <a:off x="838200" y="365125"/>
-            <a:ext cx="10515600" cy="841375"/>
-          </a:xfrm>
-        </p:spPr>
-        <p:txBody>
-          <a:bodyPr>
-            <a:normAutofit/>
-          </a:bodyPr>
-          <a:lstStyle/>
-          <a:p>
-            <a:pPr algn="ctr">
-              <a:lnSpc>
-                <a:spcPct val="100000"/>
-              </a:lnSpc>
-              <a:spcBef>
-                <a:spcPts val="1200"/>
-              </a:spcBef>
-              <a:spcAft>
-                <a:spcPts val="1200"/>
-              </a:spcAft>
-            </a:pPr>
-            <a:r>
-              <a:rPr lang="en-US" sz="3000" dirty="0" smtClean="0">
-                <a:solidFill>
-                  <a:srgbClr val="0070C0"/>
-                </a:solidFill>
-                <a:latin typeface="Century Gothic" panose="020B0502020202020204" pitchFamily="34" charset="0"/>
-                <a:ea typeface="+mn-ea"/>
-                <a:cs typeface="+mn-cs"/>
-              </a:rPr>
-              <a:t>Progress of Construction of Threshing Floor</a:t>
-            </a:r>
-            <a:endParaRPr lang="en-US" sz="3000" dirty="0">
-              <a:solidFill>
-                <a:srgbClr val="0070C0"/>
-              </a:solidFill>
-              <a:latin typeface="Century Gothic" panose="020B0502020202020204" pitchFamily="34" charset="0"/>
-              <a:ea typeface="+mn-ea"/>
-              <a:cs typeface="+mn-cs"/>
-            </a:endParaRPr>
-          </a:p>
-        </p:txBody>
-      </p:sp>
-      <p:sp>
-        <p:nvSpPr>
-          <p:cNvPr id="4" name="Slide Number Placeholder 3"/>
-          <p:cNvSpPr>
-            <a:spLocks noGrp="1"/>
-          </p:cNvSpPr>
-          <p:nvPr>
-            <p:ph type="sldNum" sz="quarter" idx="12"/>
-          </p:nvPr>
-        </p:nvSpPr>
-        <p:spPr/>
-        <p:txBody>
-          <a:bodyPr/>
-          <a:lstStyle/>
-          <a:p>
-            <a:fld id="{826EFCA3-36E9-4263-A920-02DD3CA5B069}" type="slidenum">
-              <a:rPr lang="en-CA" smtClean="0"/>
-              <a:pPr/>
-              <a:t>21</a:t>
-            </a:fld>
-            <a:endParaRPr lang="en-CA" dirty="0"/>
-          </a:p>
-        </p:txBody>
-      </p:sp>
-      <p:sp>
-        <p:nvSpPr>
-          <p:cNvPr id="3" name="Content Placeholder 2"/>
-          <p:cNvSpPr>
-            <a:spLocks noGrp="1"/>
-          </p:cNvSpPr>
-          <p:nvPr>
-            <p:ph idx="1"/>
-          </p:nvPr>
-        </p:nvSpPr>
-        <p:spPr/>
-        <p:txBody>
-          <a:bodyPr/>
-          <a:lstStyle/>
-          <a:p>
-            <a:endParaRPr lang="en-US"/>
-          </a:p>
-        </p:txBody>
-      </p:sp>
-      <p:pic>
-        <p:nvPicPr>
-          <p:cNvPr id="26642" name="Picture 18" descr="F:\Downloads\fwddataforppt\Tf_const.jpg"/>
-          <p:cNvPicPr>
-            <a:picLocks noChangeAspect="1" noChangeArrowheads="1"/>
-          </p:cNvPicPr>
-          <p:nvPr/>
-        </p:nvPicPr>
-        <p:blipFill>
-          <a:blip r:embed="rId2">
-            <a:extLst>
-              <a:ext uri="{28A0092B-C50C-407E-A947-70E740481C1C}">
-                <a14:useLocalDpi xmlns:a14="http://schemas.microsoft.com/office/drawing/2010/main" val="0"/>
-              </a:ext>
-            </a:extLst>
-          </a:blip>
-          <a:srcRect/>
-          <a:stretch>
-            <a:fillRect/>
-          </a:stretch>
-        </p:blipFill>
-        <p:spPr bwMode="auto">
-          <a:xfrm>
-            <a:off x="176982" y="973395"/>
-            <a:ext cx="11665974" cy="5209918"/>
-          </a:xfrm>
-          <a:prstGeom prst="rect">
-            <a:avLst/>
-          </a:prstGeom>
-          <a:noFill/>
-          <a:extLst>
-            <a:ext uri="{909E8E84-426E-40DD-AFC4-6F175D3DCCD1}">
-              <a14:hiddenFill xmlns:a14="http://schemas.microsoft.com/office/drawing/2010/main">
-                <a:solidFill>
-                  <a:srgbClr val="FFFFFF"/>
-                </a:solidFill>
-              </a14:hiddenFill>
-            </a:ext>
-          </a:extLst>
-        </p:spPr>
-      </p:pic>
-    </p:spTree>
-    <p:extLst>
-      <p:ext uri="{BB962C8B-B14F-4D97-AF65-F5344CB8AC3E}">
-        <p14:creationId xmlns:p14="http://schemas.microsoft.com/office/powerpoint/2010/main" val="814925863"/>
-      </p:ext>
-    </p:extLst>
-  </p:cSld>
-  <p:clrMapOvr>
-    <a:masterClrMapping/>
-  </p:clrMapOvr>
-  <p:timing>
-    <p:tnLst>
-      <p:par>
-        <p:cTn id="1" dur="indefinite" restart="never" nodeType="tmRoot"/>
-      </p:par>
-    </p:tnLst>
-  </p:timing>
-</p:sld>
-</file>
-
-<file path=ppt/slides/slide22.xml><?xml version="1.0" encoding="utf-8"?>
-<p:sld xmlns:a="http://schemas.openxmlformats.org/drawingml/2006/main" xmlns:r="http://schemas.openxmlformats.org/officeDocument/2006/relationships" xmlns:p="http://schemas.openxmlformats.org/presentationml/2006/main">
-  <p:cSld>
-    <p:spTree>
-      <p:nvGrpSpPr>
-        <p:cNvPr id="1" name=""/>
-        <p:cNvGrpSpPr/>
-        <p:nvPr/>
-      </p:nvGrpSpPr>
-      <p:grpSpPr>
-        <a:xfrm>
-          <a:off x="0" y="0"/>
-          <a:ext cx="0" cy="0"/>
-          <a:chOff x="0" y="0"/>
-          <a:chExt cx="0" cy="0"/>
-        </a:xfrm>
-      </p:grpSpPr>
-      <p:sp>
-        <p:nvSpPr>
-          <p:cNvPr id="2" name="Title 1"/>
-          <p:cNvSpPr>
-            <a:spLocks noGrp="1"/>
-          </p:cNvSpPr>
-          <p:nvPr>
-            <p:ph type="title"/>
-          </p:nvPr>
-        </p:nvSpPr>
-        <p:spPr>
-          <a:xfrm>
-            <a:off x="838200" y="365125"/>
-            <a:ext cx="10515600" cy="841375"/>
-          </a:xfrm>
-        </p:spPr>
-        <p:txBody>
-          <a:bodyPr>
-            <a:normAutofit/>
-          </a:bodyPr>
-          <a:lstStyle/>
-          <a:p>
-            <a:pPr algn="ctr">
-              <a:lnSpc>
-                <a:spcPct val="100000"/>
-              </a:lnSpc>
-              <a:spcBef>
-                <a:spcPts val="1200"/>
-              </a:spcBef>
-              <a:spcAft>
-                <a:spcPts val="1200"/>
-              </a:spcAft>
-            </a:pPr>
-            <a:r>
-              <a:rPr lang="en-US" sz="3000" dirty="0" smtClean="0">
-                <a:solidFill>
-                  <a:srgbClr val="0070C0"/>
-                </a:solidFill>
-                <a:latin typeface="Century Gothic" panose="020B0502020202020204" pitchFamily="34" charset="0"/>
-                <a:ea typeface="+mn-ea"/>
-                <a:cs typeface="+mn-cs"/>
-              </a:rPr>
-              <a:t>Progress of Replacement of Regulator Gates</a:t>
-            </a:r>
-            <a:endParaRPr lang="en-US" sz="3000" dirty="0">
-              <a:solidFill>
-                <a:srgbClr val="0070C0"/>
-              </a:solidFill>
-              <a:latin typeface="Century Gothic" panose="020B0502020202020204" pitchFamily="34" charset="0"/>
-              <a:ea typeface="+mn-ea"/>
-              <a:cs typeface="+mn-cs"/>
-            </a:endParaRPr>
-          </a:p>
-        </p:txBody>
-      </p:sp>
-      <p:sp>
-        <p:nvSpPr>
-          <p:cNvPr id="4" name="Slide Number Placeholder 3"/>
-          <p:cNvSpPr>
-            <a:spLocks noGrp="1"/>
-          </p:cNvSpPr>
-          <p:nvPr>
-            <p:ph type="sldNum" sz="quarter" idx="12"/>
-          </p:nvPr>
-        </p:nvSpPr>
-        <p:spPr/>
-        <p:txBody>
-          <a:bodyPr/>
-          <a:lstStyle/>
-          <a:p>
-            <a:fld id="{826EFCA3-36E9-4263-A920-02DD3CA5B069}" type="slidenum">
-              <a:rPr lang="en-CA" smtClean="0"/>
-              <a:pPr/>
-              <a:t>22</a:t>
-            </a:fld>
-            <a:endParaRPr lang="en-CA" dirty="0"/>
-          </a:p>
-        </p:txBody>
-      </p:sp>
-      <p:sp>
-        <p:nvSpPr>
-          <p:cNvPr id="3" name="Content Placeholder 2"/>
-          <p:cNvSpPr>
-            <a:spLocks noGrp="1"/>
-          </p:cNvSpPr>
-          <p:nvPr>
-            <p:ph idx="1"/>
-          </p:nvPr>
-        </p:nvSpPr>
-        <p:spPr/>
-        <p:txBody>
-          <a:bodyPr/>
-          <a:lstStyle/>
-          <a:p>
-            <a:endParaRPr lang="en-US"/>
-          </a:p>
-        </p:txBody>
-      </p:sp>
-      <p:pic>
-        <p:nvPicPr>
-          <p:cNvPr id="27667" name="Picture 19" descr="F:\Downloads\fwddataforppt\Rep_Gate.jpg"/>
-          <p:cNvPicPr>
-            <a:picLocks noChangeAspect="1" noChangeArrowheads="1"/>
-          </p:cNvPicPr>
-          <p:nvPr/>
-        </p:nvPicPr>
-        <p:blipFill>
-          <a:blip r:embed="rId2">
-            <a:extLst>
-              <a:ext uri="{28A0092B-C50C-407E-A947-70E740481C1C}">
-                <a14:useLocalDpi xmlns:a14="http://schemas.microsoft.com/office/drawing/2010/main" val="0"/>
-              </a:ext>
-            </a:extLst>
-          </a:blip>
-          <a:srcRect/>
-          <a:stretch>
-            <a:fillRect/>
-          </a:stretch>
-        </p:blipFill>
-        <p:spPr bwMode="auto">
-          <a:xfrm>
-            <a:off x="427703" y="1061884"/>
-            <a:ext cx="11400503" cy="5250426"/>
-          </a:xfrm>
-          <a:prstGeom prst="rect">
-            <a:avLst/>
-          </a:prstGeom>
-          <a:noFill/>
-          <a:extLst>
-            <a:ext uri="{909E8E84-426E-40DD-AFC4-6F175D3DCCD1}">
-              <a14:hiddenFill xmlns:a14="http://schemas.microsoft.com/office/drawing/2010/main">
-                <a:solidFill>
-                  <a:srgbClr val="FFFFFF"/>
-                </a:solidFill>
-              </a14:hiddenFill>
-            </a:ext>
-          </a:extLst>
-        </p:spPr>
-      </p:pic>
-    </p:spTree>
-    <p:extLst>
-      <p:ext uri="{BB962C8B-B14F-4D97-AF65-F5344CB8AC3E}">
-        <p14:creationId xmlns:p14="http://schemas.microsoft.com/office/powerpoint/2010/main" val="3182828837"/>
       </p:ext>
     </p:extLst>
   </p:cSld>
@@ -6213,25 +4935,7 @@
                 </a:solidFill>
                 <a:latin typeface="Century Gothic" panose="020B0502020202020204" pitchFamily="34" charset="0"/>
               </a:rPr>
-              <a:t>Presentations </a:t>
-            </a:r>
-            <a:r>
-              <a:rPr lang="en-CA" sz="3000" dirty="0" smtClean="0">
-                <a:solidFill>
-                  <a:srgbClr val="C00000"/>
-                </a:solidFill>
-                <a:latin typeface="Century Gothic" panose="020B0502020202020204" pitchFamily="34" charset="0"/>
-              </a:rPr>
-              <a:t>of</a:t>
-            </a:r>
-            <a:r>
-              <a:rPr lang="en-CA" sz="3000" dirty="0" smtClean="0">
-                <a:solidFill>
-                  <a:srgbClr val="C00000"/>
-                </a:solidFill>
-                <a:latin typeface="Century Gothic" panose="020B0502020202020204" pitchFamily="34" charset="0"/>
-              </a:rPr>
-              <a:t> civil works monitoring format</a:t>
+              <a:t>Presentations of civil works monitoring format</a:t>
             </a:r>
             <a:endParaRPr lang="en-CA" sz="3000" dirty="0">
               <a:solidFill>
@@ -6953,6 +5657,131 @@
           </a:bodyPr>
           <a:lstStyle/>
           <a:p>
+            <a:pPr algn="ctr"/>
+            <a:r>
+              <a:rPr lang="en-US" dirty="0" smtClean="0"/>
+              <a:t>Work Program for 2020-21</a:t>
+            </a:r>
+            <a:endParaRPr lang="en-US" dirty="0"/>
+          </a:p>
+        </p:txBody>
+      </p:sp>
+      <p:sp>
+        <p:nvSpPr>
+          <p:cNvPr id="7" name="Content Placeholder 6"/>
+          <p:cNvSpPr>
+            <a:spLocks noGrp="1"/>
+          </p:cNvSpPr>
+          <p:nvPr>
+            <p:ph idx="1"/>
+          </p:nvPr>
+        </p:nvSpPr>
+        <p:spPr/>
+        <p:txBody>
+          <a:bodyPr/>
+          <a:lstStyle/>
+          <a:p>
+            <a:endParaRPr lang="en-US"/>
+          </a:p>
+        </p:txBody>
+      </p:sp>
+      <p:graphicFrame>
+        <p:nvGraphicFramePr>
+          <p:cNvPr id="8" name="Chart 7"/>
+          <p:cNvGraphicFramePr>
+            <a:graphicFrameLocks noGrp="1"/>
+          </p:cNvGraphicFramePr>
+          <p:nvPr>
+            <p:extLst>
+              <p:ext uri="{D42A27DB-BD31-4B8C-83A1-F6EECF244321}">
+                <p14:modId xmlns:p14="http://schemas.microsoft.com/office/powerpoint/2010/main" val="552472003"/>
+              </p:ext>
+            </p:extLst>
+          </p:nvPr>
+        </p:nvGraphicFramePr>
+        <p:xfrm>
+          <a:off x="203201" y="914400"/>
+          <a:ext cx="11538857" cy="7010400"/>
+        </p:xfrm>
+        <a:graphic>
+          <a:graphicData uri="http://schemas.openxmlformats.org/drawingml/2006/chart">
+            <c:chart xmlns:c="http://schemas.openxmlformats.org/drawingml/2006/chart" xmlns:r="http://schemas.openxmlformats.org/officeDocument/2006/relationships" r:id="rId3"/>
+          </a:graphicData>
+        </a:graphic>
+      </p:graphicFrame>
+    </p:spTree>
+    <p:extLst>
+      <p:ext uri="{BB962C8B-B14F-4D97-AF65-F5344CB8AC3E}">
+        <p14:creationId xmlns:p14="http://schemas.microsoft.com/office/powerpoint/2010/main" val="3928921083"/>
+      </p:ext>
+    </p:extLst>
+  </p:cSld>
+  <p:clrMapOvr>
+    <a:masterClrMapping/>
+  </p:clrMapOvr>
+  <p:timing>
+    <p:tnLst>
+      <p:par>
+        <p:cTn id="1" dur="indefinite" restart="never" nodeType="tmRoot"/>
+      </p:par>
+    </p:tnLst>
+  </p:timing>
+</p:sld>
+</file>
+
+<file path=ppt/slides/slide6.xml><?xml version="1.0" encoding="utf-8"?>
+<p:sld xmlns:a="http://schemas.openxmlformats.org/drawingml/2006/main" xmlns:r="http://schemas.openxmlformats.org/officeDocument/2006/relationships" xmlns:p="http://schemas.openxmlformats.org/presentationml/2006/main">
+  <p:cSld>
+    <p:bg>
+      <p:bgPr>
+        <a:blipFill dpi="0" rotWithShape="1">
+          <a:blip r:embed="rId2">
+            <a:lum/>
+          </a:blip>
+          <a:srcRect/>
+          <a:stretch>
+            <a:fillRect t="-23000" b="-23000"/>
+          </a:stretch>
+        </a:blipFill>
+        <a:effectLst/>
+      </p:bgPr>
+    </p:bg>
+    <p:spTree>
+      <p:nvGrpSpPr>
+        <p:cNvPr id="1" name=""/>
+        <p:cNvGrpSpPr/>
+        <p:nvPr/>
+      </p:nvGrpSpPr>
+      <p:grpSpPr>
+        <a:xfrm>
+          <a:off x="0" y="0"/>
+          <a:ext cx="0" cy="0"/>
+          <a:chOff x="0" y="0"/>
+          <a:chExt cx="0" cy="0"/>
+        </a:xfrm>
+      </p:grpSpPr>
+      <p:sp>
+        <p:nvSpPr>
+          <p:cNvPr id="2" name="Title 1"/>
+          <p:cNvSpPr>
+            <a:spLocks noGrp="1"/>
+          </p:cNvSpPr>
+          <p:nvPr>
+            <p:ph type="title"/>
+          </p:nvPr>
+        </p:nvSpPr>
+        <p:spPr>
+          <a:xfrm>
+            <a:off x="838200" y="365125"/>
+            <a:ext cx="10515600" cy="549275"/>
+          </a:xfrm>
+        </p:spPr>
+        <p:txBody>
+          <a:bodyPr>
+            <a:normAutofit fontScale="90000"/>
+          </a:bodyPr>
+          <a:lstStyle/>
+          <a:p>
             <a:r>
               <a:rPr lang="en-US" dirty="0" smtClean="0"/>
               <a:t>Activity Plan for Next TWO Years?</a:t>
@@ -7049,7 +5878,7 @@
 </p:sld>
 </file>
 
-<file path=ppt/slides/slide6.xml><?xml version="1.0" encoding="utf-8"?>
+<file path=ppt/slides/slide7.xml><?xml version="1.0" encoding="utf-8"?>
 <p:sld xmlns:a="http://schemas.openxmlformats.org/drawingml/2006/main" xmlns:r="http://schemas.openxmlformats.org/officeDocument/2006/relationships" xmlns:p="http://schemas.openxmlformats.org/presentationml/2006/main">
   <p:cSld>
     <p:spTree>
@@ -7164,7 +5993,7 @@
             <a:fld id="{826EFCA3-36E9-4263-A920-02DD3CA5B069}" type="slidenum">
               <a:rPr lang="en-CA" smtClean="0"/>
               <a:pPr/>
-              <a:t>6</a:t>
+              <a:t>7</a:t>
             </a:fld>
             <a:endParaRPr lang="en-CA" dirty="0"/>
           </a:p>
@@ -7231,7 +6060,7 @@
 </p:sld>
 </file>
 
-<file path=ppt/slides/slide7.xml><?xml version="1.0" encoding="utf-8"?>
+<file path=ppt/slides/slide8.xml><?xml version="1.0" encoding="utf-8"?>
 <p:sld xmlns:a="http://schemas.openxmlformats.org/drawingml/2006/main" xmlns:r="http://schemas.openxmlformats.org/officeDocument/2006/relationships" xmlns:p="http://schemas.openxmlformats.org/presentationml/2006/main">
   <p:cSld>
     <p:bg>
@@ -7284,10 +6113,6 @@
           </a:bodyPr>
           <a:lstStyle/>
           <a:p>
-            <a:r>
-              <a:rPr lang="en-US" dirty="0" smtClean="0"/>
-              <a:t>?</a:t>
-            </a:r>
             <a:endParaRPr lang="en-US" dirty="0"/>
           </a:p>
         </p:txBody>
@@ -7460,110 +6285,6 @@
     <p:extLst>
       <p:ext uri="{BB962C8B-B14F-4D97-AF65-F5344CB8AC3E}">
         <p14:creationId xmlns:p14="http://schemas.microsoft.com/office/powerpoint/2010/main" val="2212578500"/>
-      </p:ext>
-    </p:extLst>
-  </p:cSld>
-  <p:clrMapOvr>
-    <a:masterClrMapping/>
-  </p:clrMapOvr>
-  <p:timing>
-    <p:tnLst>
-      <p:par>
-        <p:cTn id="1" dur="indefinite" restart="never" nodeType="tmRoot"/>
-      </p:par>
-    </p:tnLst>
-  </p:timing>
-</p:sld>
-</file>
-
-<file path=ppt/slides/slide8.xml><?xml version="1.0" encoding="utf-8"?>
-<p:sld xmlns:a="http://schemas.openxmlformats.org/drawingml/2006/main" xmlns:r="http://schemas.openxmlformats.org/officeDocument/2006/relationships" xmlns:p="http://schemas.openxmlformats.org/presentationml/2006/main">
-  <p:cSld>
-    <p:bg>
-      <p:bgPr>
-        <a:blipFill dpi="0" rotWithShape="1">
-          <a:blip r:embed="rId2">
-            <a:lum/>
-          </a:blip>
-          <a:srcRect/>
-          <a:stretch>
-            <a:fillRect t="-23000" b="-23000"/>
-          </a:stretch>
-        </a:blipFill>
-        <a:effectLst/>
-      </p:bgPr>
-    </p:bg>
-    <p:spTree>
-      <p:nvGrpSpPr>
-        <p:cNvPr id="1" name=""/>
-        <p:cNvGrpSpPr/>
-        <p:nvPr/>
-      </p:nvGrpSpPr>
-      <p:grpSpPr>
-        <a:xfrm>
-          <a:off x="0" y="0"/>
-          <a:ext cx="0" cy="0"/>
-          <a:chOff x="0" y="0"/>
-          <a:chExt cx="0" cy="0"/>
-        </a:xfrm>
-      </p:grpSpPr>
-      <p:sp>
-        <p:nvSpPr>
-          <p:cNvPr id="2" name="Title 1"/>
-          <p:cNvSpPr>
-            <a:spLocks noGrp="1"/>
-          </p:cNvSpPr>
-          <p:nvPr>
-            <p:ph type="title"/>
-          </p:nvPr>
-        </p:nvSpPr>
-        <p:spPr>
-          <a:xfrm>
-            <a:off x="838200" y="365125"/>
-            <a:ext cx="10515600" cy="549275"/>
-          </a:xfrm>
-        </p:spPr>
-        <p:txBody>
-          <a:bodyPr>
-            <a:normAutofit fontScale="90000"/>
-          </a:bodyPr>
-          <a:lstStyle/>
-          <a:p>
-            <a:endParaRPr lang="en-US" dirty="0"/>
-          </a:p>
-        </p:txBody>
-      </p:sp>
-      <p:sp>
-        <p:nvSpPr>
-          <p:cNvPr id="3" name="Content Placeholder 2"/>
-          <p:cNvSpPr>
-            <a:spLocks noGrp="1"/>
-          </p:cNvSpPr>
-          <p:nvPr>
-            <p:ph idx="1"/>
-          </p:nvPr>
-        </p:nvSpPr>
-        <p:spPr>
-          <a:xfrm>
-            <a:off x="838200" y="914400"/>
-            <a:ext cx="10515600" cy="5262563"/>
-          </a:xfrm>
-        </p:spPr>
-        <p:txBody>
-          <a:bodyPr/>
-          <a:lstStyle/>
-          <a:p>
-            <a:pPr marL="0" indent="0">
-              <a:buNone/>
-            </a:pPr>
-            <a:endParaRPr lang="en-US" dirty="0"/>
-          </a:p>
-        </p:txBody>
-      </p:sp>
-    </p:spTree>
-    <p:extLst>
-      <p:ext uri="{BB962C8B-B14F-4D97-AF65-F5344CB8AC3E}">
-        <p14:creationId xmlns:p14="http://schemas.microsoft.com/office/powerpoint/2010/main" val="97388935"/>
       </p:ext>
     </p:extLst>
   </p:cSld>

</xml_diff>